<commit_message>
Add Voelter logo to title picture
</commit_message>
<xml_diff>
--- a/stuff/MPS Introduction Course.pptx
+++ b/stuff/MPS Introduction Course.pptx
@@ -104,6 +104,11 @@
       </a:defRPr>
     </a:lvl9pPr>
   </p:defaultTextStyle>
+  <p:extLst>
+    <p:ext uri="{EFAFB233-063F-42B5-8137-9DF3F51BA10A}">
+      <p15:sldGuideLst xmlns:p15="http://schemas.microsoft.com/office/powerpoint/2012/main"/>
+    </p:ext>
+  </p:extLst>
 </p:presentation>
 </file>
 
@@ -3735,7 +3740,7 @@
         </p:blipFill>
         <p:spPr bwMode="auto">
           <a:xfrm>
-            <a:off x="8485093" y="6207161"/>
+            <a:off x="6610002" y="5983668"/>
             <a:ext cx="1230407" cy="348936"/>
           </a:xfrm>
           <a:prstGeom prst="rect">
@@ -3751,6 +3756,36 @@
               </a14:hiddenFill>
             </a:ext>
           </a:extLst>
+        </p:spPr>
+      </p:pic>
+      <p:pic>
+        <p:nvPicPr>
+          <p:cNvPr id="2" name="Picture 1">
+            <a:extLst>
+              <a:ext uri="{FF2B5EF4-FFF2-40B4-BE49-F238E27FC236}">
+                <a16:creationId xmlns:a16="http://schemas.microsoft.com/office/drawing/2014/main" id="{84714549-E138-46CB-A16E-FA09229CFF77}"/>
+              </a:ext>
+            </a:extLst>
+          </p:cNvPr>
+          <p:cNvPicPr>
+            <a:picLocks noChangeAspect="1"/>
+          </p:cNvPicPr>
+          <p:nvPr/>
+        </p:nvPicPr>
+        <p:blipFill>
+          <a:blip r:embed="rId7"/>
+          <a:stretch>
+            <a:fillRect/>
+          </a:stretch>
+        </p:blipFill>
+        <p:spPr>
+          <a:xfrm>
+            <a:off x="8199109" y="5954926"/>
+            <a:ext cx="2921150" cy="406421"/>
+          </a:xfrm>
+          <a:prstGeom prst="rect">
+            <a:avLst/>
+          </a:prstGeom>
         </p:spPr>
       </p:pic>
     </p:spTree>

</xml_diff>

<commit_message>
Update cover sheet to MPS 2019.3
</commit_message>
<xml_diff>
--- a/stuff/MPS Introduction Course.pptx
+++ b/stuff/MPS Introduction Course.pptx
@@ -261,7 +261,7 @@
           <a:p>
             <a:fld id="{364B33E3-F096-4790-85F9-6F30B12C491A}" type="datetimeFigureOut">
               <a:rPr lang="nl-NL" smtClean="0"/>
-              <a:t>4-11-2019</a:t>
+              <a:t>2-2-2021</a:t>
             </a:fld>
             <a:endParaRPr lang="nl-NL"/>
           </a:p>
@@ -461,7 +461,7 @@
           <a:p>
             <a:fld id="{364B33E3-F096-4790-85F9-6F30B12C491A}" type="datetimeFigureOut">
               <a:rPr lang="nl-NL" smtClean="0"/>
-              <a:t>4-11-2019</a:t>
+              <a:t>2-2-2021</a:t>
             </a:fld>
             <a:endParaRPr lang="nl-NL"/>
           </a:p>
@@ -671,7 +671,7 @@
           <a:p>
             <a:fld id="{364B33E3-F096-4790-85F9-6F30B12C491A}" type="datetimeFigureOut">
               <a:rPr lang="nl-NL" smtClean="0"/>
-              <a:t>4-11-2019</a:t>
+              <a:t>2-2-2021</a:t>
             </a:fld>
             <a:endParaRPr lang="nl-NL"/>
           </a:p>
@@ -871,7 +871,7 @@
           <a:p>
             <a:fld id="{364B33E3-F096-4790-85F9-6F30B12C491A}" type="datetimeFigureOut">
               <a:rPr lang="nl-NL" smtClean="0"/>
-              <a:t>4-11-2019</a:t>
+              <a:t>2-2-2021</a:t>
             </a:fld>
             <a:endParaRPr lang="nl-NL"/>
           </a:p>
@@ -1147,7 +1147,7 @@
           <a:p>
             <a:fld id="{364B33E3-F096-4790-85F9-6F30B12C491A}" type="datetimeFigureOut">
               <a:rPr lang="nl-NL" smtClean="0"/>
-              <a:t>4-11-2019</a:t>
+              <a:t>2-2-2021</a:t>
             </a:fld>
             <a:endParaRPr lang="nl-NL"/>
           </a:p>
@@ -1415,7 +1415,7 @@
           <a:p>
             <a:fld id="{364B33E3-F096-4790-85F9-6F30B12C491A}" type="datetimeFigureOut">
               <a:rPr lang="nl-NL" smtClean="0"/>
-              <a:t>4-11-2019</a:t>
+              <a:t>2-2-2021</a:t>
             </a:fld>
             <a:endParaRPr lang="nl-NL"/>
           </a:p>
@@ -1830,7 +1830,7 @@
           <a:p>
             <a:fld id="{364B33E3-F096-4790-85F9-6F30B12C491A}" type="datetimeFigureOut">
               <a:rPr lang="nl-NL" smtClean="0"/>
-              <a:t>4-11-2019</a:t>
+              <a:t>2-2-2021</a:t>
             </a:fld>
             <a:endParaRPr lang="nl-NL"/>
           </a:p>
@@ -1972,7 +1972,7 @@
           <a:p>
             <a:fld id="{364B33E3-F096-4790-85F9-6F30B12C491A}" type="datetimeFigureOut">
               <a:rPr lang="nl-NL" smtClean="0"/>
-              <a:t>4-11-2019</a:t>
+              <a:t>2-2-2021</a:t>
             </a:fld>
             <a:endParaRPr lang="nl-NL"/>
           </a:p>
@@ -2085,7 +2085,7 @@
           <a:p>
             <a:fld id="{364B33E3-F096-4790-85F9-6F30B12C491A}" type="datetimeFigureOut">
               <a:rPr lang="nl-NL" smtClean="0"/>
-              <a:t>4-11-2019</a:t>
+              <a:t>2-2-2021</a:t>
             </a:fld>
             <a:endParaRPr lang="nl-NL"/>
           </a:p>
@@ -2398,7 +2398,7 @@
           <a:p>
             <a:fld id="{364B33E3-F096-4790-85F9-6F30B12C491A}" type="datetimeFigureOut">
               <a:rPr lang="nl-NL" smtClean="0"/>
-              <a:t>4-11-2019</a:t>
+              <a:t>2-2-2021</a:t>
             </a:fld>
             <a:endParaRPr lang="nl-NL"/>
           </a:p>
@@ -2687,7 +2687,7 @@
           <a:p>
             <a:fld id="{364B33E3-F096-4790-85F9-6F30B12C491A}" type="datetimeFigureOut">
               <a:rPr lang="nl-NL" smtClean="0"/>
-              <a:t>4-11-2019</a:t>
+              <a:t>2-2-2021</a:t>
             </a:fld>
             <a:endParaRPr lang="nl-NL"/>
           </a:p>
@@ -2930,7 +2930,7 @@
           <a:p>
             <a:fld id="{364B33E3-F096-4790-85F9-6F30B12C491A}" type="datetimeFigureOut">
               <a:rPr lang="nl-NL" smtClean="0"/>
-              <a:t>4-11-2019</a:t>
+              <a:t>2-2-2021</a:t>
             </a:fld>
             <a:endParaRPr lang="nl-NL"/>
           </a:p>
@@ -3479,6 +3479,17 @@
           <a:lstStyle/>
           <a:p>
             <a:r>
+              <a:rPr lang="en-US" sz="2500" b="1">
+                <a:solidFill>
+                  <a:schemeClr val="tx1">
+                    <a:lumMod val="65000"/>
+                    <a:lumOff val="35000"/>
+                  </a:schemeClr>
+                </a:solidFill>
+              </a:rPr>
+              <a:t>MPS 2019.3.</a:t>
+            </a:r>
+            <a:r>
               <a:rPr lang="en-US" sz="2500" b="1" dirty="0">
                 <a:solidFill>
                   <a:schemeClr val="tx1">
@@ -3487,7 +3498,7 @@
                   </a:schemeClr>
                 </a:solidFill>
               </a:rPr>
-              <a:t>MPS 2019.2.x + </a:t>
+              <a:t>x + </a:t>
             </a:r>
             <a:r>
               <a:rPr lang="en-US" sz="2500" b="1" dirty="0" err="1">

</xml_diff>

<commit_message>
Adapt title to support for MPS 2020.3 and add maintained by DSLFoundry
</commit_message>
<xml_diff>
--- a/stuff/MPS Introduction Course.pptx
+++ b/stuff/MPS Introduction Course.pptx
@@ -261,7 +261,7 @@
           <a:p>
             <a:fld id="{364B33E3-F096-4790-85F9-6F30B12C491A}" type="datetimeFigureOut">
               <a:rPr lang="nl-NL" smtClean="0"/>
-              <a:t>2-2-2021</a:t>
+              <a:t>11-4-2021</a:t>
             </a:fld>
             <a:endParaRPr lang="nl-NL"/>
           </a:p>
@@ -461,7 +461,7 @@
           <a:p>
             <a:fld id="{364B33E3-F096-4790-85F9-6F30B12C491A}" type="datetimeFigureOut">
               <a:rPr lang="nl-NL" smtClean="0"/>
-              <a:t>2-2-2021</a:t>
+              <a:t>11-4-2021</a:t>
             </a:fld>
             <a:endParaRPr lang="nl-NL"/>
           </a:p>
@@ -671,7 +671,7 @@
           <a:p>
             <a:fld id="{364B33E3-F096-4790-85F9-6F30B12C491A}" type="datetimeFigureOut">
               <a:rPr lang="nl-NL" smtClean="0"/>
-              <a:t>2-2-2021</a:t>
+              <a:t>11-4-2021</a:t>
             </a:fld>
             <a:endParaRPr lang="nl-NL"/>
           </a:p>
@@ -871,7 +871,7 @@
           <a:p>
             <a:fld id="{364B33E3-F096-4790-85F9-6F30B12C491A}" type="datetimeFigureOut">
               <a:rPr lang="nl-NL" smtClean="0"/>
-              <a:t>2-2-2021</a:t>
+              <a:t>11-4-2021</a:t>
             </a:fld>
             <a:endParaRPr lang="nl-NL"/>
           </a:p>
@@ -1147,7 +1147,7 @@
           <a:p>
             <a:fld id="{364B33E3-F096-4790-85F9-6F30B12C491A}" type="datetimeFigureOut">
               <a:rPr lang="nl-NL" smtClean="0"/>
-              <a:t>2-2-2021</a:t>
+              <a:t>11-4-2021</a:t>
             </a:fld>
             <a:endParaRPr lang="nl-NL"/>
           </a:p>
@@ -1415,7 +1415,7 @@
           <a:p>
             <a:fld id="{364B33E3-F096-4790-85F9-6F30B12C491A}" type="datetimeFigureOut">
               <a:rPr lang="nl-NL" smtClean="0"/>
-              <a:t>2-2-2021</a:t>
+              <a:t>11-4-2021</a:t>
             </a:fld>
             <a:endParaRPr lang="nl-NL"/>
           </a:p>
@@ -1830,7 +1830,7 @@
           <a:p>
             <a:fld id="{364B33E3-F096-4790-85F9-6F30B12C491A}" type="datetimeFigureOut">
               <a:rPr lang="nl-NL" smtClean="0"/>
-              <a:t>2-2-2021</a:t>
+              <a:t>11-4-2021</a:t>
             </a:fld>
             <a:endParaRPr lang="nl-NL"/>
           </a:p>
@@ -1972,7 +1972,7 @@
           <a:p>
             <a:fld id="{364B33E3-F096-4790-85F9-6F30B12C491A}" type="datetimeFigureOut">
               <a:rPr lang="nl-NL" smtClean="0"/>
-              <a:t>2-2-2021</a:t>
+              <a:t>11-4-2021</a:t>
             </a:fld>
             <a:endParaRPr lang="nl-NL"/>
           </a:p>
@@ -2085,7 +2085,7 @@
           <a:p>
             <a:fld id="{364B33E3-F096-4790-85F9-6F30B12C491A}" type="datetimeFigureOut">
               <a:rPr lang="nl-NL" smtClean="0"/>
-              <a:t>2-2-2021</a:t>
+              <a:t>11-4-2021</a:t>
             </a:fld>
             <a:endParaRPr lang="nl-NL"/>
           </a:p>
@@ -2398,7 +2398,7 @@
           <a:p>
             <a:fld id="{364B33E3-F096-4790-85F9-6F30B12C491A}" type="datetimeFigureOut">
               <a:rPr lang="nl-NL" smtClean="0"/>
-              <a:t>2-2-2021</a:t>
+              <a:t>11-4-2021</a:t>
             </a:fld>
             <a:endParaRPr lang="nl-NL"/>
           </a:p>
@@ -2687,7 +2687,7 @@
           <a:p>
             <a:fld id="{364B33E3-F096-4790-85F9-6F30B12C491A}" type="datetimeFigureOut">
               <a:rPr lang="nl-NL" smtClean="0"/>
-              <a:t>2-2-2021</a:t>
+              <a:t>11-4-2021</a:t>
             </a:fld>
             <a:endParaRPr lang="nl-NL"/>
           </a:p>
@@ -2930,7 +2930,7 @@
           <a:p>
             <a:fld id="{364B33E3-F096-4790-85F9-6F30B12C491A}" type="datetimeFigureOut">
               <a:rPr lang="nl-NL" smtClean="0"/>
-              <a:t>2-2-2021</a:t>
+              <a:t>11-4-2021</a:t>
             </a:fld>
             <a:endParaRPr lang="nl-NL"/>
           </a:p>
@@ -3479,17 +3479,6 @@
           <a:lstStyle/>
           <a:p>
             <a:r>
-              <a:rPr lang="en-US" sz="2500" b="1">
-                <a:solidFill>
-                  <a:schemeClr val="tx1">
-                    <a:lumMod val="65000"/>
-                    <a:lumOff val="35000"/>
-                  </a:schemeClr>
-                </a:solidFill>
-              </a:rPr>
-              <a:t>MPS 2020.2.</a:t>
-            </a:r>
-            <a:r>
               <a:rPr lang="en-US" sz="2500" b="1" dirty="0">
                 <a:solidFill>
                   <a:schemeClr val="tx1">
@@ -3498,7 +3487,7 @@
                   </a:schemeClr>
                 </a:solidFill>
               </a:rPr>
-              <a:t>x + </a:t>
+              <a:t>MPS 2020.3.x + </a:t>
             </a:r>
             <a:r>
               <a:rPr lang="en-US" sz="2500" b="1" dirty="0" err="1">
@@ -3799,6 +3788,88 @@
           </a:prstGeom>
         </p:spPr>
       </p:pic>
+      <p:pic>
+        <p:nvPicPr>
+          <p:cNvPr id="4" name="Picture 3">
+            <a:extLst>
+              <a:ext uri="{FF2B5EF4-FFF2-40B4-BE49-F238E27FC236}">
+                <a16:creationId xmlns:a16="http://schemas.microsoft.com/office/drawing/2014/main" id="{63B0B032-669B-4958-888B-66C14AF84AB5}"/>
+              </a:ext>
+            </a:extLst>
+          </p:cNvPr>
+          <p:cNvPicPr>
+            <a:picLocks noChangeAspect="1"/>
+          </p:cNvPicPr>
+          <p:nvPr/>
+        </p:nvPicPr>
+        <p:blipFill>
+          <a:blip r:embed="rId8">
+            <a:extLst>
+              <a:ext uri="{28A0092B-C50C-407E-A947-70E740481C1C}">
+                <a14:useLocalDpi xmlns:a14="http://schemas.microsoft.com/office/drawing/2010/main" val="0"/>
+              </a:ext>
+            </a:extLst>
+          </a:blip>
+          <a:stretch>
+            <a:fillRect/>
+          </a:stretch>
+        </p:blipFill>
+        <p:spPr>
+          <a:xfrm>
+            <a:off x="1690262" y="6034201"/>
+            <a:ext cx="649027" cy="298403"/>
+          </a:xfrm>
+          <a:prstGeom prst="rect">
+            <a:avLst/>
+          </a:prstGeom>
+        </p:spPr>
+      </p:pic>
+      <p:sp>
+        <p:nvSpPr>
+          <p:cNvPr id="13" name="Rectangle 12">
+            <a:extLst>
+              <a:ext uri="{FF2B5EF4-FFF2-40B4-BE49-F238E27FC236}">
+                <a16:creationId xmlns:a16="http://schemas.microsoft.com/office/drawing/2014/main" id="{47C69D20-0340-4F48-8796-6AE92392BFA8}"/>
+              </a:ext>
+            </a:extLst>
+          </p:cNvPr>
+          <p:cNvSpPr/>
+          <p:nvPr/>
+        </p:nvSpPr>
+        <p:spPr>
+          <a:xfrm>
+            <a:off x="757652" y="5944102"/>
+            <a:ext cx="1002197" cy="253916"/>
+          </a:xfrm>
+          <a:prstGeom prst="rect">
+            <a:avLst/>
+          </a:prstGeom>
+        </p:spPr>
+        <p:txBody>
+          <a:bodyPr wrap="none">
+            <a:spAutoFit/>
+          </a:bodyPr>
+          <a:lstStyle/>
+          <a:p>
+            <a:r>
+              <a:rPr lang="nl-NL" sz="1050" dirty="0" err="1"/>
+              <a:t>maintained</a:t>
+            </a:r>
+            <a:r>
+              <a:rPr lang="nl-NL" sz="1050" dirty="0"/>
+              <a:t> </a:t>
+            </a:r>
+            <a:r>
+              <a:rPr lang="nl-NL" sz="1050" dirty="0" err="1"/>
+              <a:t>by</a:t>
+            </a:r>
+            <a:r>
+              <a:rPr lang="nl-NL" sz="1050" dirty="0"/>
+              <a:t>:</a:t>
+            </a:r>
+          </a:p>
+        </p:txBody>
+      </p:sp>
     </p:spTree>
     <p:extLst>
       <p:ext uri="{BB962C8B-B14F-4D97-AF65-F5344CB8AC3E}">

</xml_diff>

<commit_message>
Adapt documentation to 2022.2 migration
</commit_message>
<xml_diff>
--- a/stuff/MPS Introduction Course.pptx
+++ b/stuff/MPS Introduction Course.pptx
@@ -1,19 +1,424 @@
 
 <file path=ppt/presentation.xml><?xml version="1.0" encoding="utf-8"?>
-<p:presentation xmlns:a="http://schemas.openxmlformats.org/drawingml/2006/main" xmlns:p="http://schemas.openxmlformats.org/presentationml/2006/main" xmlns:r="http://schemas.openxmlformats.org/officeDocument/2006/relationships" xmlns:p14="http://schemas.microsoft.com/office/powerpoint/2010/main" xmlns:p15="http://schemas.microsoft.com/office/powerpoint/2012/main" xmlns:mc="http://schemas.openxmlformats.org/markup-compatibility/2006">
+<p:presentation xmlns:a="http://schemas.openxmlformats.org/drawingml/2006/main" xmlns:r="http://schemas.openxmlformats.org/officeDocument/2006/relationships" xmlns:p="http://schemas.openxmlformats.org/presentationml/2006/main" xmlns:m="http://schemas.openxmlformats.org/officeDocument/2006/math" xmlns:w="http://schemas.openxmlformats.org/wordprocessingml/2006/main">
   <p:sldMasterIdLst>
-    <p:sldMasterId id="2147483648" r:id="rId2"/>
+    <p:sldMasterId id="2147483648" r:id="rId1"/>
   </p:sldMasterIdLst>
+  <p:notesMasterIdLst>
+    <p:notesMasterId r:id="rId5"/>
+  </p:notesMasterIdLst>
   <p:sldIdLst>
-    <p:sldId id="256" r:id="rId3"/>
+    <p:sldId id="256" r:id="rId4"/>
   </p:sldIdLst>
   <p:sldSz cx="12192000" cy="6858000"/>
   <p:notesSz cx="7772400" cy="10058400"/>
 </p:presentation>
 </file>
 
+<file path=ppt/notesMasters/notesMaster1.xml><?xml version="1.0" encoding="utf-8"?>
+<p:notesMaster xmlns:a="http://schemas.openxmlformats.org/drawingml/2006/main" xmlns:r="http://schemas.openxmlformats.org/officeDocument/2006/relationships" xmlns:p="http://schemas.openxmlformats.org/presentationml/2006/main">
+  <p:cSld name="">
+    <p:bg>
+      <p:bgRef idx="1001">
+        <a:schemeClr val="bg1"/>
+      </p:bgRef>
+    </p:bg>
+    <p:spTree>
+      <p:nvGrpSpPr>
+        <p:cNvPr id="1" name=""/>
+        <p:cNvGrpSpPr/>
+        <p:nvPr/>
+      </p:nvGrpSpPr>
+      <p:grpSpPr bwMode="auto">
+        <a:xfrm>
+          <a:off x="0" y="0"/>
+          <a:ext cx="0" cy="0"/>
+          <a:chOff x="0" y="0"/>
+          <a:chExt cx="0" cy="0"/>
+        </a:xfrm>
+      </p:grpSpPr>
+      <p:sp>
+        <p:nvSpPr>
+          <p:cNvPr id="2" name="Header Placeholder 1"/>
+          <p:cNvSpPr>
+            <a:spLocks noGrp="1"/>
+          </p:cNvSpPr>
+          <p:nvPr>
+            <p:ph type="hdr" sz="quarter"/>
+          </p:nvPr>
+        </p:nvSpPr>
+        <p:spPr bwMode="auto">
+          <a:xfrm>
+            <a:off x="0" y="0"/>
+            <a:ext cx="2971800" cy="458788"/>
+          </a:xfrm>
+          <a:prstGeom prst="rect">
+            <a:avLst/>
+          </a:prstGeom>
+        </p:spPr>
+        <p:txBody>
+          <a:bodyPr vert="horz" lIns="91440" tIns="45720" rIns="91440" bIns="45720" rtlCol="0" anchor="ctr"/>
+          <a:lstStyle>
+            <a:lvl1pPr algn="l">
+              <a:defRPr sz="1200"/>
+            </a:lvl1pPr>
+          </a:lstStyle>
+          <a:p>
+            <a:pPr>
+              <a:defRPr/>
+            </a:pPr>
+            <a:endParaRPr/>
+          </a:p>
+        </p:txBody>
+      </p:sp>
+      <p:sp>
+        <p:nvSpPr>
+          <p:cNvPr id="3" name="Date Placeholder 2"/>
+          <p:cNvSpPr>
+            <a:spLocks noGrp="1"/>
+          </p:cNvSpPr>
+          <p:nvPr>
+            <p:ph type="dt" idx="2"/>
+          </p:nvPr>
+        </p:nvSpPr>
+        <p:spPr bwMode="auto">
+          <a:xfrm>
+            <a:off x="3884613" y="0"/>
+            <a:ext cx="2971800" cy="458788"/>
+          </a:xfrm>
+          <a:prstGeom prst="rect">
+            <a:avLst/>
+          </a:prstGeom>
+        </p:spPr>
+        <p:txBody>
+          <a:bodyPr vert="horz" lIns="91440" tIns="45720" rIns="91440" bIns="45720" rtlCol="0" anchor="ctr"/>
+          <a:lstStyle>
+            <a:lvl1pPr algn="r">
+              <a:defRPr sz="1200"/>
+            </a:lvl1pPr>
+          </a:lstStyle>
+          <a:p>
+            <a:pPr>
+              <a:defRPr/>
+            </a:pPr>
+            <a:endParaRPr/>
+          </a:p>
+        </p:txBody>
+      </p:sp>
+      <p:sp>
+        <p:nvSpPr>
+          <p:cNvPr id="3" name="Date Placeholder 2"/>
+          <p:cNvSpPr>
+            <a:spLocks noGrp="1"/>
+          </p:cNvSpPr>
+          <p:nvPr>
+            <p:ph type="dt" idx="3"/>
+          </p:nvPr>
+        </p:nvSpPr>
+        <p:spPr bwMode="auto">
+          <a:xfrm>
+            <a:off x="3884613" y="0"/>
+            <a:ext cx="2971800" cy="458788"/>
+          </a:xfrm>
+          <a:prstGeom prst="rect">
+            <a:avLst/>
+          </a:prstGeom>
+        </p:spPr>
+        <p:txBody>
+          <a:bodyPr vert="horz" lIns="91440" tIns="45720" rIns="91440" bIns="45720" rtlCol="0" anchor="ctr"/>
+          <a:lstStyle>
+            <a:lvl1pPr algn="r">
+              <a:defRPr sz="1200"/>
+            </a:lvl1pPr>
+          </a:lstStyle>
+          <a:p>
+            <a:pPr>
+              <a:defRPr/>
+            </a:pPr>
+            <a:endParaRPr/>
+          </a:p>
+        </p:txBody>
+      </p:sp>
+      <p:sp>
+        <p:nvSpPr>
+          <p:cNvPr id="5" name="Notes Placeholder 4"/>
+          <p:cNvSpPr>
+            <a:spLocks noGrp="1"/>
+          </p:cNvSpPr>
+          <p:nvPr>
+            <p:ph type="body" sz="quarter" idx="1"/>
+          </p:nvPr>
+        </p:nvSpPr>
+        <p:spPr bwMode="auto">
+          <a:xfrm>
+            <a:off x="685800" y="4400550"/>
+            <a:ext cx="5486400" cy="3600450"/>
+          </a:xfrm>
+          <a:prstGeom prst="rect">
+            <a:avLst/>
+          </a:prstGeom>
+        </p:spPr>
+        <p:txBody>
+          <a:bodyPr vert="horz" lIns="91440" tIns="45720" rIns="91440" bIns="45720" rtlCol="0" anchor="ctr"/>
+          <a:lstStyle/>
+          <a:p>
+            <a:pPr>
+              <a:defRPr/>
+            </a:pPr>
+            <a:endParaRPr/>
+          </a:p>
+        </p:txBody>
+      </p:sp>
+      <p:sp>
+        <p:nvSpPr>
+          <p:cNvPr id="6" name="Footer Placeholder 5"/>
+          <p:cNvSpPr>
+            <a:spLocks noGrp="1"/>
+          </p:cNvSpPr>
+          <p:nvPr>
+            <p:ph type="ftr" sz="quarter" idx="4"/>
+          </p:nvPr>
+        </p:nvSpPr>
+        <p:spPr bwMode="auto">
+          <a:xfrm>
+            <a:off x="0" y="8685213"/>
+            <a:ext cx="2971800" cy="458787"/>
+          </a:xfrm>
+          <a:prstGeom prst="rect">
+            <a:avLst/>
+          </a:prstGeom>
+        </p:spPr>
+        <p:txBody>
+          <a:bodyPr vert="horz" lIns="91440" tIns="45720" rIns="91440" bIns="45720" rtlCol="0" anchor="b"/>
+          <a:lstStyle>
+            <a:lvl1pPr algn="l">
+              <a:defRPr sz="1200"/>
+            </a:lvl1pPr>
+          </a:lstStyle>
+          <a:p>
+            <a:pPr>
+              <a:defRPr/>
+            </a:pPr>
+            <a:endParaRPr/>
+          </a:p>
+        </p:txBody>
+      </p:sp>
+      <p:sp>
+        <p:nvSpPr>
+          <p:cNvPr id="7" name="Slide Number Placeholder 6"/>
+          <p:cNvSpPr>
+            <a:spLocks noGrp="1"/>
+          </p:cNvSpPr>
+          <p:nvPr>
+            <p:ph type="sldNum" sz="quarter" idx="10"/>
+          </p:nvPr>
+        </p:nvSpPr>
+        <p:spPr bwMode="auto">
+          <a:xfrm>
+            <a:off x="3884613" y="8685213"/>
+            <a:ext cx="2971800" cy="458787"/>
+          </a:xfrm>
+          <a:prstGeom prst="rect">
+            <a:avLst/>
+          </a:prstGeom>
+        </p:spPr>
+        <p:txBody>
+          <a:bodyPr vert="horz" lIns="91440" tIns="45720" rIns="91440" bIns="45720" rtlCol="0" anchor="b"/>
+          <a:lstStyle>
+            <a:lvl1pPr algn="r">
+              <a:defRPr sz="1200"/>
+            </a:lvl1pPr>
+          </a:lstStyle>
+          <a:p>
+            <a:pPr>
+              <a:defRPr/>
+            </a:pPr>
+            <a:endParaRPr/>
+          </a:p>
+        </p:txBody>
+      </p:sp>
+    </p:spTree>
+  </p:cSld>
+  <p:clrMap bg1="lt1" tx1="dk1" bg2="lt2" tx2="dk2" accent1="accent1" accent2="accent2" accent3="accent3" accent4="accent4" accent5="accent5" accent6="accent6" hlink="hlink" folHlink="folHlink"/>
+  <p:notesStyle>
+    <a:lvl1pPr marL="0" algn="l" defTabSz="914400">
+      <a:defRPr sz="1200">
+        <a:solidFill>
+          <a:schemeClr val="tx1"/>
+        </a:solidFill>
+        <a:latin typeface="+mn-lt"/>
+        <a:ea typeface="+mn-ea"/>
+        <a:cs typeface="+mn-cs"/>
+      </a:defRPr>
+    </a:lvl1pPr>
+    <a:lvl2pPr marL="457200" algn="l" defTabSz="914400">
+      <a:defRPr sz="1200">
+        <a:solidFill>
+          <a:schemeClr val="tx1"/>
+        </a:solidFill>
+        <a:latin typeface="+mn-lt"/>
+        <a:ea typeface="+mn-ea"/>
+        <a:cs typeface="+mn-cs"/>
+      </a:defRPr>
+    </a:lvl2pPr>
+    <a:lvl3pPr marL="914400" algn="l" defTabSz="914400">
+      <a:defRPr sz="1200">
+        <a:solidFill>
+          <a:schemeClr val="tx1"/>
+        </a:solidFill>
+        <a:latin typeface="+mn-lt"/>
+        <a:ea typeface="+mn-ea"/>
+        <a:cs typeface="+mn-cs"/>
+      </a:defRPr>
+    </a:lvl3pPr>
+    <a:lvl4pPr marL="1371600" algn="l" defTabSz="914400">
+      <a:defRPr sz="1200">
+        <a:solidFill>
+          <a:schemeClr val="tx1"/>
+        </a:solidFill>
+        <a:latin typeface="+mn-lt"/>
+        <a:ea typeface="+mn-ea"/>
+        <a:cs typeface="+mn-cs"/>
+      </a:defRPr>
+    </a:lvl4pPr>
+    <a:lvl5pPr marL="1828800" algn="l" defTabSz="914400">
+      <a:defRPr sz="1200">
+        <a:solidFill>
+          <a:schemeClr val="tx1"/>
+        </a:solidFill>
+        <a:latin typeface="+mn-lt"/>
+        <a:ea typeface="+mn-ea"/>
+        <a:cs typeface="+mn-cs"/>
+      </a:defRPr>
+    </a:lvl5pPr>
+    <a:lvl6pPr marL="2286000" algn="l" defTabSz="914400">
+      <a:defRPr sz="1200">
+        <a:solidFill>
+          <a:schemeClr val="tx1"/>
+        </a:solidFill>
+        <a:latin typeface="+mn-lt"/>
+        <a:ea typeface="+mn-ea"/>
+        <a:cs typeface="+mn-cs"/>
+      </a:defRPr>
+    </a:lvl6pPr>
+    <a:lvl7pPr marL="2743200" algn="l" defTabSz="914400">
+      <a:defRPr sz="1200">
+        <a:solidFill>
+          <a:schemeClr val="tx1"/>
+        </a:solidFill>
+        <a:latin typeface="+mn-lt"/>
+        <a:ea typeface="+mn-ea"/>
+        <a:cs typeface="+mn-cs"/>
+      </a:defRPr>
+    </a:lvl7pPr>
+    <a:lvl8pPr marL="3200400" algn="l" defTabSz="914400">
+      <a:defRPr sz="1200">
+        <a:solidFill>
+          <a:schemeClr val="tx1"/>
+        </a:solidFill>
+        <a:latin typeface="+mn-lt"/>
+        <a:ea typeface="+mn-ea"/>
+        <a:cs typeface="+mn-cs"/>
+      </a:defRPr>
+    </a:lvl8pPr>
+    <a:lvl9pPr marL="3657600" algn="l" defTabSz="914400">
+      <a:defRPr sz="1200">
+        <a:solidFill>
+          <a:schemeClr val="tx1"/>
+        </a:solidFill>
+        <a:latin typeface="+mn-lt"/>
+        <a:ea typeface="+mn-ea"/>
+        <a:cs typeface="+mn-cs"/>
+      </a:defRPr>
+    </a:lvl9pPr>
+  </p:notesStyle>
+</p:notesMaster>
+</file>
+
+<file path=ppt/notesSlides/notesSlide1.xml><?xml version="1.0" encoding="utf-8"?>
+<p:notes xmlns:a="http://schemas.openxmlformats.org/drawingml/2006/main" xmlns:r="http://schemas.openxmlformats.org/officeDocument/2006/relationships" xmlns:p="http://schemas.openxmlformats.org/presentationml/2006/main" xmlns:m="http://schemas.openxmlformats.org/officeDocument/2006/math" xmlns:w="http://schemas.openxmlformats.org/wordprocessingml/2006/main">
+  <p:cSld name="">
+    <p:spTree>
+      <p:nvGrpSpPr>
+        <p:cNvPr id="1" name=""/>
+        <p:cNvGrpSpPr/>
+        <p:nvPr/>
+      </p:nvGrpSpPr>
+      <p:grpSpPr bwMode="auto">
+        <a:xfrm>
+          <a:off x="0" y="0"/>
+          <a:ext cx="0" cy="0"/>
+          <a:chOff x="0" y="0"/>
+          <a:chExt cx="0" cy="0"/>
+        </a:xfrm>
+      </p:grpSpPr>
+      <p:sp>
+        <p:nvSpPr>
+          <p:cNvPr id="2" name="Slide Image Placeholder 1"/>
+          <p:cNvSpPr>
+            <a:spLocks noChangeAspect="1" noGrp="1" noRot="1"/>
+          </p:cNvSpPr>
+          <p:nvPr>
+            <p:ph type="sldImg"/>
+          </p:nvPr>
+        </p:nvSpPr>
+        <p:spPr bwMode="auto"/>
+      </p:sp>
+      <p:sp>
+        <p:nvSpPr>
+          <p:cNvPr id="3" name="Notes Placeholder 2"/>
+          <p:cNvSpPr>
+            <a:spLocks noGrp="1"/>
+          </p:cNvSpPr>
+          <p:nvPr>
+            <p:ph type="body" idx="1"/>
+          </p:nvPr>
+        </p:nvSpPr>
+        <p:spPr bwMode="auto"/>
+        <p:txBody>
+          <a:bodyPr/>
+          <a:lstStyle/>
+          <a:p>
+            <a:pPr>
+              <a:defRPr/>
+            </a:pPr>
+            <a:endParaRPr/>
+          </a:p>
+        </p:txBody>
+      </p:sp>
+      <p:sp>
+        <p:nvSpPr>
+          <p:cNvPr id="4" name="Slide Number Placeholder 3"/>
+          <p:cNvSpPr>
+            <a:spLocks noGrp="1"/>
+          </p:cNvSpPr>
+          <p:nvPr>
+            <p:ph type="sldNum" sz="quarter" idx="10"/>
+          </p:nvPr>
+        </p:nvSpPr>
+        <p:spPr bwMode="auto"/>
+        <p:txBody>
+          <a:bodyPr/>
+          <a:lstStyle/>
+          <a:p>
+            <a:pPr>
+              <a:defRPr/>
+            </a:pPr>
+            <a:fld id="{FCC578AF-CBFB-51A6-66DD-9D1A9797690F}" type="slidenum">
+              <a:rPr/>
+              <a:t/>
+            </a:fld>
+            <a:endParaRPr/>
+          </a:p>
+        </p:txBody>
+      </p:sp>
+    </p:spTree>
+  </p:cSld>
+</p:notes>
+</file>
+
 <file path=ppt/slideLayouts/slideLayout1.xml><?xml version="1.0" encoding="utf-8"?>
-<p:sldLayout xmlns:a="http://schemas.openxmlformats.org/drawingml/2006/main" xmlns:p="http://schemas.openxmlformats.org/presentationml/2006/main" xmlns:r="http://schemas.openxmlformats.org/officeDocument/2006/relationships" xmlns:p14="http://schemas.microsoft.com/office/powerpoint/2010/main" xmlns:p15="http://schemas.microsoft.com/office/powerpoint/2012/main" xmlns:mc="http://schemas.openxmlformats.org/markup-compatibility/2006" type="blank" preserve="1">
+<p:sldLayout xmlns:a="http://schemas.openxmlformats.org/drawingml/2006/main" xmlns:r="http://schemas.openxmlformats.org/officeDocument/2006/relationships" xmlns:p="http://schemas.openxmlformats.org/presentationml/2006/main" xmlns:m="http://schemas.openxmlformats.org/officeDocument/2006/math" xmlns:w="http://schemas.openxmlformats.org/wordprocessingml/2006/main" matchingName="" preserve="1" showMasterPhAnim="0" type="blank" userDrawn="1">
   <p:cSld name="Blank Slide">
     <p:spTree>
       <p:nvGrpSpPr>
@@ -21,7 +426,7 @@
         <p:cNvGrpSpPr/>
         <p:nvPr/>
       </p:nvGrpSpPr>
-      <p:grpSpPr>
+      <p:grpSpPr bwMode="auto">
         <a:xfrm>
           <a:off x="0" y="0"/>
           <a:ext cx="0" cy="0"/>
@@ -31,11 +436,14 @@
       </p:grpSpPr>
     </p:spTree>
   </p:cSld>
+  <p:clrMapOvr>
+    <a:masterClrMapping/>
+  </p:clrMapOvr>
 </p:sldLayout>
 </file>
 
 <file path=ppt/slideLayouts/slideLayout10.xml><?xml version="1.0" encoding="utf-8"?>
-<p:sldLayout xmlns:a="http://schemas.openxmlformats.org/drawingml/2006/main" xmlns:p="http://schemas.openxmlformats.org/presentationml/2006/main" xmlns:r="http://schemas.openxmlformats.org/officeDocument/2006/relationships" xmlns:p14="http://schemas.microsoft.com/office/powerpoint/2010/main" xmlns:p15="http://schemas.microsoft.com/office/powerpoint/2012/main" xmlns:mc="http://schemas.openxmlformats.org/markup-compatibility/2006" type="objOverTx" preserve="1">
+<p:sldLayout xmlns:a="http://schemas.openxmlformats.org/drawingml/2006/main" xmlns:r="http://schemas.openxmlformats.org/officeDocument/2006/relationships" xmlns:p="http://schemas.openxmlformats.org/presentationml/2006/main" xmlns:m="http://schemas.openxmlformats.org/officeDocument/2006/math" xmlns:w="http://schemas.openxmlformats.org/wordprocessingml/2006/main" matchingName="" preserve="1" showMasterPhAnim="0" type="objOverTx" userDrawn="1">
   <p:cSld name="Title, Content over Content">
     <p:spTree>
       <p:nvGrpSpPr>
@@ -43,7 +451,7 @@
         <p:cNvGrpSpPr/>
         <p:nvPr/>
       </p:nvGrpSpPr>
-      <p:grpSpPr>
+      <p:grpSpPr bwMode="auto">
         <a:xfrm>
           <a:off x="0" y="0"/>
           <a:ext cx="0" cy="0"/>
@@ -61,7 +469,7 @@
             <p:ph type="title"/>
           </p:nvPr>
         </p:nvSpPr>
-        <p:spPr>
+        <p:spPr bwMode="auto">
           <a:xfrm>
             <a:off x="1523880" y="1122480"/>
             <a:ext cx="9143640" cy="2387160"/>
@@ -71,11 +479,14 @@
           </a:prstGeom>
         </p:spPr>
         <p:txBody>
-          <a:bodyPr lIns="0" rIns="0" tIns="0" bIns="0" anchor="ctr">
+          <a:bodyPr lIns="0" tIns="0" rIns="0" bIns="0" anchor="ctr">
             <a:noAutofit/>
           </a:bodyPr>
           <a:p>
-            <a:endParaRPr b="0" lang="nl-NL" sz="1800" spc="-1" strike="noStrike">
+            <a:pPr>
+              <a:defRPr/>
+            </a:pPr>
+            <a:endParaRPr lang="nl-NL" sz="1800" b="0" strike="noStrike" spc="-1">
               <a:solidFill>
                 <a:srgbClr val="000000"/>
               </a:solidFill>
@@ -94,7 +505,7 @@
             <p:ph type="body"/>
           </p:nvPr>
         </p:nvSpPr>
-        <p:spPr>
+        <p:spPr bwMode="auto">
           <a:xfrm>
             <a:off x="609480" y="1604520"/>
             <a:ext cx="10972440" cy="1896840"/>
@@ -104,11 +515,14 @@
           </a:prstGeom>
         </p:spPr>
         <p:txBody>
-          <a:bodyPr lIns="0" rIns="0" tIns="0" bIns="0">
+          <a:bodyPr lIns="0" tIns="0" rIns="0" bIns="0">
             <a:normAutofit/>
           </a:bodyPr>
           <a:p>
-            <a:endParaRPr b="0" lang="nl-NL" sz="2800" spc="-1" strike="noStrike">
+            <a:pPr>
+              <a:defRPr/>
+            </a:pPr>
+            <a:endParaRPr lang="nl-NL" sz="2800" b="0" strike="noStrike" spc="-1">
               <a:solidFill>
                 <a:srgbClr val="000000"/>
               </a:solidFill>
@@ -127,7 +541,7 @@
             <p:ph type="body"/>
           </p:nvPr>
         </p:nvSpPr>
-        <p:spPr>
+        <p:spPr bwMode="auto">
           <a:xfrm>
             <a:off x="609480" y="3682080"/>
             <a:ext cx="10972440" cy="1896840"/>
@@ -137,11 +551,14 @@
           </a:prstGeom>
         </p:spPr>
         <p:txBody>
-          <a:bodyPr lIns="0" rIns="0" tIns="0" bIns="0">
+          <a:bodyPr lIns="0" tIns="0" rIns="0" bIns="0">
             <a:normAutofit/>
           </a:bodyPr>
           <a:p>
-            <a:endParaRPr b="0" lang="nl-NL" sz="2800" spc="-1" strike="noStrike">
+            <a:pPr>
+              <a:defRPr/>
+            </a:pPr>
+            <a:endParaRPr lang="nl-NL" sz="2800" b="0" strike="noStrike" spc="-1">
               <a:solidFill>
                 <a:srgbClr val="000000"/>
               </a:solidFill>
@@ -152,11 +569,14 @@
       </p:sp>
     </p:spTree>
   </p:cSld>
+  <p:clrMapOvr>
+    <a:masterClrMapping/>
+  </p:clrMapOvr>
 </p:sldLayout>
 </file>
 
 <file path=ppt/slideLayouts/slideLayout11.xml><?xml version="1.0" encoding="utf-8"?>
-<p:sldLayout xmlns:a="http://schemas.openxmlformats.org/drawingml/2006/main" xmlns:p="http://schemas.openxmlformats.org/presentationml/2006/main" xmlns:r="http://schemas.openxmlformats.org/officeDocument/2006/relationships" xmlns:p14="http://schemas.microsoft.com/office/powerpoint/2010/main" xmlns:p15="http://schemas.microsoft.com/office/powerpoint/2012/main" xmlns:mc="http://schemas.openxmlformats.org/markup-compatibility/2006" type="fourObj" preserve="1">
+<p:sldLayout xmlns:a="http://schemas.openxmlformats.org/drawingml/2006/main" xmlns:r="http://schemas.openxmlformats.org/officeDocument/2006/relationships" xmlns:p="http://schemas.openxmlformats.org/presentationml/2006/main" xmlns:m="http://schemas.openxmlformats.org/officeDocument/2006/math" xmlns:w="http://schemas.openxmlformats.org/wordprocessingml/2006/main" matchingName="" preserve="1" showMasterPhAnim="0" type="fourObj" userDrawn="1">
   <p:cSld name="Title, 4 Content">
     <p:spTree>
       <p:nvGrpSpPr>
@@ -164,7 +584,7 @@
         <p:cNvGrpSpPr/>
         <p:nvPr/>
       </p:nvGrpSpPr>
-      <p:grpSpPr>
+      <p:grpSpPr bwMode="auto">
         <a:xfrm>
           <a:off x="0" y="0"/>
           <a:ext cx="0" cy="0"/>
@@ -182,7 +602,7 @@
             <p:ph type="title"/>
           </p:nvPr>
         </p:nvSpPr>
-        <p:spPr>
+        <p:spPr bwMode="auto">
           <a:xfrm>
             <a:off x="1523880" y="1122480"/>
             <a:ext cx="9143640" cy="2387160"/>
@@ -192,11 +612,14 @@
           </a:prstGeom>
         </p:spPr>
         <p:txBody>
-          <a:bodyPr lIns="0" rIns="0" tIns="0" bIns="0" anchor="ctr">
+          <a:bodyPr lIns="0" tIns="0" rIns="0" bIns="0" anchor="ctr">
             <a:noAutofit/>
           </a:bodyPr>
           <a:p>
-            <a:endParaRPr b="0" lang="nl-NL" sz="1800" spc="-1" strike="noStrike">
+            <a:pPr>
+              <a:defRPr/>
+            </a:pPr>
+            <a:endParaRPr lang="nl-NL" sz="1800" b="0" strike="noStrike" spc="-1">
               <a:solidFill>
                 <a:srgbClr val="000000"/>
               </a:solidFill>
@@ -215,7 +638,7 @@
             <p:ph type="body"/>
           </p:nvPr>
         </p:nvSpPr>
-        <p:spPr>
+        <p:spPr bwMode="auto">
           <a:xfrm>
             <a:off x="609480" y="1604520"/>
             <a:ext cx="5354280" cy="1896840"/>
@@ -225,11 +648,14 @@
           </a:prstGeom>
         </p:spPr>
         <p:txBody>
-          <a:bodyPr lIns="0" rIns="0" tIns="0" bIns="0">
+          <a:bodyPr lIns="0" tIns="0" rIns="0" bIns="0">
             <a:normAutofit/>
           </a:bodyPr>
           <a:p>
-            <a:endParaRPr b="0" lang="nl-NL" sz="2800" spc="-1" strike="noStrike">
+            <a:pPr>
+              <a:defRPr/>
+            </a:pPr>
+            <a:endParaRPr lang="nl-NL" sz="2800" b="0" strike="noStrike" spc="-1">
               <a:solidFill>
                 <a:srgbClr val="000000"/>
               </a:solidFill>
@@ -248,7 +674,7 @@
             <p:ph type="body"/>
           </p:nvPr>
         </p:nvSpPr>
-        <p:spPr>
+        <p:spPr bwMode="auto">
           <a:xfrm>
             <a:off x="6231960" y="1604520"/>
             <a:ext cx="5354280" cy="1896840"/>
@@ -258,11 +684,14 @@
           </a:prstGeom>
         </p:spPr>
         <p:txBody>
-          <a:bodyPr lIns="0" rIns="0" tIns="0" bIns="0">
+          <a:bodyPr lIns="0" tIns="0" rIns="0" bIns="0">
             <a:normAutofit/>
           </a:bodyPr>
           <a:p>
-            <a:endParaRPr b="0" lang="nl-NL" sz="2800" spc="-1" strike="noStrike">
+            <a:pPr>
+              <a:defRPr/>
+            </a:pPr>
+            <a:endParaRPr lang="nl-NL" sz="2800" b="0" strike="noStrike" spc="-1">
               <a:solidFill>
                 <a:srgbClr val="000000"/>
               </a:solidFill>
@@ -281,7 +710,7 @@
             <p:ph type="body"/>
           </p:nvPr>
         </p:nvSpPr>
-        <p:spPr>
+        <p:spPr bwMode="auto">
           <a:xfrm>
             <a:off x="609480" y="3682080"/>
             <a:ext cx="5354280" cy="1896840"/>
@@ -291,11 +720,14 @@
           </a:prstGeom>
         </p:spPr>
         <p:txBody>
-          <a:bodyPr lIns="0" rIns="0" tIns="0" bIns="0">
+          <a:bodyPr lIns="0" tIns="0" rIns="0" bIns="0">
             <a:normAutofit/>
           </a:bodyPr>
           <a:p>
-            <a:endParaRPr b="0" lang="nl-NL" sz="2800" spc="-1" strike="noStrike">
+            <a:pPr>
+              <a:defRPr/>
+            </a:pPr>
+            <a:endParaRPr lang="nl-NL" sz="2800" b="0" strike="noStrike" spc="-1">
               <a:solidFill>
                 <a:srgbClr val="000000"/>
               </a:solidFill>
@@ -314,7 +746,7 @@
             <p:ph type="body"/>
           </p:nvPr>
         </p:nvSpPr>
-        <p:spPr>
+        <p:spPr bwMode="auto">
           <a:xfrm>
             <a:off x="6231960" y="3682080"/>
             <a:ext cx="5354280" cy="1896840"/>
@@ -324,11 +756,14 @@
           </a:prstGeom>
         </p:spPr>
         <p:txBody>
-          <a:bodyPr lIns="0" rIns="0" tIns="0" bIns="0">
+          <a:bodyPr lIns="0" tIns="0" rIns="0" bIns="0">
             <a:normAutofit/>
           </a:bodyPr>
           <a:p>
-            <a:endParaRPr b="0" lang="nl-NL" sz="2800" spc="-1" strike="noStrike">
+            <a:pPr>
+              <a:defRPr/>
+            </a:pPr>
+            <a:endParaRPr lang="nl-NL" sz="2800" b="0" strike="noStrike" spc="-1">
               <a:solidFill>
                 <a:srgbClr val="000000"/>
               </a:solidFill>
@@ -339,11 +774,14 @@
       </p:sp>
     </p:spTree>
   </p:cSld>
+  <p:clrMapOvr>
+    <a:masterClrMapping/>
+  </p:clrMapOvr>
 </p:sldLayout>
 </file>
 
 <file path=ppt/slideLayouts/slideLayout12.xml><?xml version="1.0" encoding="utf-8"?>
-<p:sldLayout xmlns:a="http://schemas.openxmlformats.org/drawingml/2006/main" xmlns:p="http://schemas.openxmlformats.org/presentationml/2006/main" xmlns:r="http://schemas.openxmlformats.org/officeDocument/2006/relationships" xmlns:p14="http://schemas.microsoft.com/office/powerpoint/2010/main" xmlns:p15="http://schemas.microsoft.com/office/powerpoint/2012/main" xmlns:mc="http://schemas.openxmlformats.org/markup-compatibility/2006" type="blank" preserve="1">
+<p:sldLayout xmlns:a="http://schemas.openxmlformats.org/drawingml/2006/main" xmlns:r="http://schemas.openxmlformats.org/officeDocument/2006/relationships" xmlns:p="http://schemas.openxmlformats.org/presentationml/2006/main" xmlns:m="http://schemas.openxmlformats.org/officeDocument/2006/math" xmlns:w="http://schemas.openxmlformats.org/wordprocessingml/2006/main" matchingName="" preserve="1" showMasterPhAnim="0" type="blank" userDrawn="1">
   <p:cSld name="Title, 6 Content">
     <p:spTree>
       <p:nvGrpSpPr>
@@ -351,7 +789,7 @@
         <p:cNvGrpSpPr/>
         <p:nvPr/>
       </p:nvGrpSpPr>
-      <p:grpSpPr>
+      <p:grpSpPr bwMode="auto">
         <a:xfrm>
           <a:off x="0" y="0"/>
           <a:ext cx="0" cy="0"/>
@@ -369,7 +807,7 @@
             <p:ph type="title"/>
           </p:nvPr>
         </p:nvSpPr>
-        <p:spPr>
+        <p:spPr bwMode="auto">
           <a:xfrm>
             <a:off x="1523880" y="1122480"/>
             <a:ext cx="9143640" cy="2387160"/>
@@ -379,11 +817,14 @@
           </a:prstGeom>
         </p:spPr>
         <p:txBody>
-          <a:bodyPr lIns="0" rIns="0" tIns="0" bIns="0" anchor="ctr">
+          <a:bodyPr lIns="0" tIns="0" rIns="0" bIns="0" anchor="ctr">
             <a:noAutofit/>
           </a:bodyPr>
           <a:p>
-            <a:endParaRPr b="0" lang="nl-NL" sz="1800" spc="-1" strike="noStrike">
+            <a:pPr>
+              <a:defRPr/>
+            </a:pPr>
+            <a:endParaRPr lang="nl-NL" sz="1800" b="0" strike="noStrike" spc="-1">
               <a:solidFill>
                 <a:srgbClr val="000000"/>
               </a:solidFill>
@@ -402,7 +843,7 @@
             <p:ph type="body"/>
           </p:nvPr>
         </p:nvSpPr>
-        <p:spPr>
+        <p:spPr bwMode="auto">
           <a:xfrm>
             <a:off x="609480" y="1604520"/>
             <a:ext cx="3533040" cy="1896840"/>
@@ -412,11 +853,14 @@
           </a:prstGeom>
         </p:spPr>
         <p:txBody>
-          <a:bodyPr lIns="0" rIns="0" tIns="0" bIns="0">
+          <a:bodyPr lIns="0" tIns="0" rIns="0" bIns="0">
             <a:normAutofit/>
           </a:bodyPr>
           <a:p>
-            <a:endParaRPr b="0" lang="nl-NL" sz="2800" spc="-1" strike="noStrike">
+            <a:pPr>
+              <a:defRPr/>
+            </a:pPr>
+            <a:endParaRPr lang="nl-NL" sz="2800" b="0" strike="noStrike" spc="-1">
               <a:solidFill>
                 <a:srgbClr val="000000"/>
               </a:solidFill>
@@ -435,7 +879,7 @@
             <p:ph type="body"/>
           </p:nvPr>
         </p:nvSpPr>
-        <p:spPr>
+        <p:spPr bwMode="auto">
           <a:xfrm>
             <a:off x="4319640" y="1604520"/>
             <a:ext cx="3533040" cy="1896840"/>
@@ -445,11 +889,14 @@
           </a:prstGeom>
         </p:spPr>
         <p:txBody>
-          <a:bodyPr lIns="0" rIns="0" tIns="0" bIns="0">
+          <a:bodyPr lIns="0" tIns="0" rIns="0" bIns="0">
             <a:normAutofit/>
           </a:bodyPr>
           <a:p>
-            <a:endParaRPr b="0" lang="nl-NL" sz="2800" spc="-1" strike="noStrike">
+            <a:pPr>
+              <a:defRPr/>
+            </a:pPr>
+            <a:endParaRPr lang="nl-NL" sz="2800" b="0" strike="noStrike" spc="-1">
               <a:solidFill>
                 <a:srgbClr val="000000"/>
               </a:solidFill>
@@ -468,7 +915,7 @@
             <p:ph type="body"/>
           </p:nvPr>
         </p:nvSpPr>
-        <p:spPr>
+        <p:spPr bwMode="auto">
           <a:xfrm>
             <a:off x="8029800" y="1604520"/>
             <a:ext cx="3533040" cy="1896840"/>
@@ -478,11 +925,14 @@
           </a:prstGeom>
         </p:spPr>
         <p:txBody>
-          <a:bodyPr lIns="0" rIns="0" tIns="0" bIns="0">
+          <a:bodyPr lIns="0" tIns="0" rIns="0" bIns="0">
             <a:normAutofit/>
           </a:bodyPr>
           <a:p>
-            <a:endParaRPr b="0" lang="nl-NL" sz="2800" spc="-1" strike="noStrike">
+            <a:pPr>
+              <a:defRPr/>
+            </a:pPr>
+            <a:endParaRPr lang="nl-NL" sz="2800" b="0" strike="noStrike" spc="-1">
               <a:solidFill>
                 <a:srgbClr val="000000"/>
               </a:solidFill>
@@ -501,7 +951,7 @@
             <p:ph type="body"/>
           </p:nvPr>
         </p:nvSpPr>
-        <p:spPr>
+        <p:spPr bwMode="auto">
           <a:xfrm>
             <a:off x="609480" y="3682080"/>
             <a:ext cx="3533040" cy="1896840"/>
@@ -511,11 +961,14 @@
           </a:prstGeom>
         </p:spPr>
         <p:txBody>
-          <a:bodyPr lIns="0" rIns="0" tIns="0" bIns="0">
+          <a:bodyPr lIns="0" tIns="0" rIns="0" bIns="0">
             <a:normAutofit/>
           </a:bodyPr>
           <a:p>
-            <a:endParaRPr b="0" lang="nl-NL" sz="2800" spc="-1" strike="noStrike">
+            <a:pPr>
+              <a:defRPr/>
+            </a:pPr>
+            <a:endParaRPr lang="nl-NL" sz="2800" b="0" strike="noStrike" spc="-1">
               <a:solidFill>
                 <a:srgbClr val="000000"/>
               </a:solidFill>
@@ -534,7 +987,7 @@
             <p:ph type="body"/>
           </p:nvPr>
         </p:nvSpPr>
-        <p:spPr>
+        <p:spPr bwMode="auto">
           <a:xfrm>
             <a:off x="4319640" y="3682080"/>
             <a:ext cx="3533040" cy="1896840"/>
@@ -544,11 +997,14 @@
           </a:prstGeom>
         </p:spPr>
         <p:txBody>
-          <a:bodyPr lIns="0" rIns="0" tIns="0" bIns="0">
+          <a:bodyPr lIns="0" tIns="0" rIns="0" bIns="0">
             <a:normAutofit/>
           </a:bodyPr>
           <a:p>
-            <a:endParaRPr b="0" lang="nl-NL" sz="2800" spc="-1" strike="noStrike">
+            <a:pPr>
+              <a:defRPr/>
+            </a:pPr>
+            <a:endParaRPr lang="nl-NL" sz="2800" b="0" strike="noStrike" spc="-1">
               <a:solidFill>
                 <a:srgbClr val="000000"/>
               </a:solidFill>
@@ -567,7 +1023,7 @@
             <p:ph type="body"/>
           </p:nvPr>
         </p:nvSpPr>
-        <p:spPr>
+        <p:spPr bwMode="auto">
           <a:xfrm>
             <a:off x="8029800" y="3682080"/>
             <a:ext cx="3533040" cy="1896840"/>
@@ -577,11 +1033,14 @@
           </a:prstGeom>
         </p:spPr>
         <p:txBody>
-          <a:bodyPr lIns="0" rIns="0" tIns="0" bIns="0">
+          <a:bodyPr lIns="0" tIns="0" rIns="0" bIns="0">
             <a:normAutofit/>
           </a:bodyPr>
           <a:p>
-            <a:endParaRPr b="0" lang="nl-NL" sz="2800" spc="-1" strike="noStrike">
+            <a:pPr>
+              <a:defRPr/>
+            </a:pPr>
+            <a:endParaRPr lang="nl-NL" sz="2800" b="0" strike="noStrike" spc="-1">
               <a:solidFill>
                 <a:srgbClr val="000000"/>
               </a:solidFill>
@@ -592,11 +1051,14 @@
       </p:sp>
     </p:spTree>
   </p:cSld>
+  <p:clrMapOvr>
+    <a:masterClrMapping/>
+  </p:clrMapOvr>
 </p:sldLayout>
 </file>
 
 <file path=ppt/slideLayouts/slideLayout2.xml><?xml version="1.0" encoding="utf-8"?>
-<p:sldLayout xmlns:a="http://schemas.openxmlformats.org/drawingml/2006/main" xmlns:p="http://schemas.openxmlformats.org/presentationml/2006/main" xmlns:r="http://schemas.openxmlformats.org/officeDocument/2006/relationships" xmlns:p14="http://schemas.microsoft.com/office/powerpoint/2010/main" xmlns:p15="http://schemas.microsoft.com/office/powerpoint/2012/main" xmlns:mc="http://schemas.openxmlformats.org/markup-compatibility/2006" type="tx" preserve="1">
+<p:sldLayout xmlns:a="http://schemas.openxmlformats.org/drawingml/2006/main" xmlns:r="http://schemas.openxmlformats.org/officeDocument/2006/relationships" xmlns:p="http://schemas.openxmlformats.org/presentationml/2006/main" xmlns:m="http://schemas.openxmlformats.org/officeDocument/2006/math" xmlns:w="http://schemas.openxmlformats.org/wordprocessingml/2006/main" matchingName="" preserve="1" showMasterPhAnim="0" type="tx" userDrawn="1">
   <p:cSld name="Title Slide">
     <p:spTree>
       <p:nvGrpSpPr>
@@ -604,7 +1066,7 @@
         <p:cNvGrpSpPr/>
         <p:nvPr/>
       </p:nvGrpSpPr>
-      <p:grpSpPr>
+      <p:grpSpPr bwMode="auto">
         <a:xfrm>
           <a:off x="0" y="0"/>
           <a:ext cx="0" cy="0"/>
@@ -622,7 +1084,7 @@
             <p:ph type="title"/>
           </p:nvPr>
         </p:nvSpPr>
-        <p:spPr>
+        <p:spPr bwMode="auto">
           <a:xfrm>
             <a:off x="1523880" y="1122480"/>
             <a:ext cx="9143640" cy="2387160"/>
@@ -632,11 +1094,14 @@
           </a:prstGeom>
         </p:spPr>
         <p:txBody>
-          <a:bodyPr lIns="0" rIns="0" tIns="0" bIns="0" anchor="ctr">
+          <a:bodyPr lIns="0" tIns="0" rIns="0" bIns="0" anchor="ctr">
             <a:noAutofit/>
           </a:bodyPr>
           <a:p>
-            <a:endParaRPr b="0" lang="nl-NL" sz="1800" spc="-1" strike="noStrike">
+            <a:pPr>
+              <a:defRPr/>
+            </a:pPr>
+            <a:endParaRPr lang="nl-NL" sz="1800" b="0" strike="noStrike" spc="-1">
               <a:solidFill>
                 <a:srgbClr val="000000"/>
               </a:solidFill>
@@ -655,7 +1120,7 @@
             <p:ph type="subTitle"/>
           </p:nvPr>
         </p:nvSpPr>
-        <p:spPr>
+        <p:spPr bwMode="auto">
           <a:xfrm>
             <a:off x="609480" y="1604520"/>
             <a:ext cx="10972440" cy="3977280"/>
@@ -665,12 +1130,14 @@
           </a:prstGeom>
         </p:spPr>
         <p:txBody>
-          <a:bodyPr lIns="0" rIns="0" tIns="0" bIns="0" anchor="ctr">
+          <a:bodyPr lIns="0" tIns="0" rIns="0" bIns="0" anchor="ctr">
             <a:noAutofit/>
           </a:bodyPr>
           <a:p>
-            <a:pPr algn="ctr"/>
-            <a:endParaRPr b="0" lang="en-US" sz="3200" spc="-1" strike="noStrike">
+            <a:pPr algn="ctr">
+              <a:defRPr/>
+            </a:pPr>
+            <a:endParaRPr lang="en-US" sz="3200" b="0" strike="noStrike" spc="-1">
               <a:latin typeface="Arial"/>
             </a:endParaRPr>
           </a:p>
@@ -678,11 +1145,14 @@
       </p:sp>
     </p:spTree>
   </p:cSld>
+  <p:clrMapOvr>
+    <a:masterClrMapping/>
+  </p:clrMapOvr>
 </p:sldLayout>
 </file>
 
 <file path=ppt/slideLayouts/slideLayout3.xml><?xml version="1.0" encoding="utf-8"?>
-<p:sldLayout xmlns:a="http://schemas.openxmlformats.org/drawingml/2006/main" xmlns:p="http://schemas.openxmlformats.org/presentationml/2006/main" xmlns:r="http://schemas.openxmlformats.org/officeDocument/2006/relationships" xmlns:p14="http://schemas.microsoft.com/office/powerpoint/2010/main" xmlns:p15="http://schemas.microsoft.com/office/powerpoint/2012/main" xmlns:mc="http://schemas.openxmlformats.org/markup-compatibility/2006" type="obj" preserve="1">
+<p:sldLayout xmlns:a="http://schemas.openxmlformats.org/drawingml/2006/main" xmlns:r="http://schemas.openxmlformats.org/officeDocument/2006/relationships" xmlns:p="http://schemas.openxmlformats.org/presentationml/2006/main" xmlns:m="http://schemas.openxmlformats.org/officeDocument/2006/math" xmlns:w="http://schemas.openxmlformats.org/wordprocessingml/2006/main" matchingName="" preserve="1" showMasterPhAnim="0" type="obj" userDrawn="1">
   <p:cSld name="Title, Content">
     <p:spTree>
       <p:nvGrpSpPr>
@@ -690,7 +1160,7 @@
         <p:cNvGrpSpPr/>
         <p:nvPr/>
       </p:nvGrpSpPr>
-      <p:grpSpPr>
+      <p:grpSpPr bwMode="auto">
         <a:xfrm>
           <a:off x="0" y="0"/>
           <a:ext cx="0" cy="0"/>
@@ -708,7 +1178,7 @@
             <p:ph type="title"/>
           </p:nvPr>
         </p:nvSpPr>
-        <p:spPr>
+        <p:spPr bwMode="auto">
           <a:xfrm>
             <a:off x="1523880" y="1122480"/>
             <a:ext cx="9143640" cy="2387160"/>
@@ -718,11 +1188,14 @@
           </a:prstGeom>
         </p:spPr>
         <p:txBody>
-          <a:bodyPr lIns="0" rIns="0" tIns="0" bIns="0" anchor="ctr">
+          <a:bodyPr lIns="0" tIns="0" rIns="0" bIns="0" anchor="ctr">
             <a:noAutofit/>
           </a:bodyPr>
           <a:p>
-            <a:endParaRPr b="0" lang="nl-NL" sz="1800" spc="-1" strike="noStrike">
+            <a:pPr>
+              <a:defRPr/>
+            </a:pPr>
+            <a:endParaRPr lang="nl-NL" sz="1800" b="0" strike="noStrike" spc="-1">
               <a:solidFill>
                 <a:srgbClr val="000000"/>
               </a:solidFill>
@@ -741,7 +1214,7 @@
             <p:ph type="body"/>
           </p:nvPr>
         </p:nvSpPr>
-        <p:spPr>
+        <p:spPr bwMode="auto">
           <a:xfrm>
             <a:off x="609480" y="1604520"/>
             <a:ext cx="10972440" cy="3977280"/>
@@ -751,11 +1224,14 @@
           </a:prstGeom>
         </p:spPr>
         <p:txBody>
-          <a:bodyPr lIns="0" rIns="0" tIns="0" bIns="0">
+          <a:bodyPr lIns="0" tIns="0" rIns="0" bIns="0">
             <a:normAutofit/>
           </a:bodyPr>
           <a:p>
-            <a:endParaRPr b="0" lang="nl-NL" sz="2800" spc="-1" strike="noStrike">
+            <a:pPr>
+              <a:defRPr/>
+            </a:pPr>
+            <a:endParaRPr lang="nl-NL" sz="2800" b="0" strike="noStrike" spc="-1">
               <a:solidFill>
                 <a:srgbClr val="000000"/>
               </a:solidFill>
@@ -766,11 +1242,14 @@
       </p:sp>
     </p:spTree>
   </p:cSld>
+  <p:clrMapOvr>
+    <a:masterClrMapping/>
+  </p:clrMapOvr>
 </p:sldLayout>
 </file>
 
 <file path=ppt/slideLayouts/slideLayout4.xml><?xml version="1.0" encoding="utf-8"?>
-<p:sldLayout xmlns:a="http://schemas.openxmlformats.org/drawingml/2006/main" xmlns:p="http://schemas.openxmlformats.org/presentationml/2006/main" xmlns:r="http://schemas.openxmlformats.org/officeDocument/2006/relationships" xmlns:p14="http://schemas.microsoft.com/office/powerpoint/2010/main" xmlns:p15="http://schemas.microsoft.com/office/powerpoint/2012/main" xmlns:mc="http://schemas.openxmlformats.org/markup-compatibility/2006" type="twoObj" preserve="1">
+<p:sldLayout xmlns:a="http://schemas.openxmlformats.org/drawingml/2006/main" xmlns:r="http://schemas.openxmlformats.org/officeDocument/2006/relationships" xmlns:p="http://schemas.openxmlformats.org/presentationml/2006/main" xmlns:m="http://schemas.openxmlformats.org/officeDocument/2006/math" xmlns:w="http://schemas.openxmlformats.org/wordprocessingml/2006/main" matchingName="" preserve="1" showMasterPhAnim="0" type="twoObj" userDrawn="1">
   <p:cSld name="Title, 2 Content">
     <p:spTree>
       <p:nvGrpSpPr>
@@ -778,7 +1257,7 @@
         <p:cNvGrpSpPr/>
         <p:nvPr/>
       </p:nvGrpSpPr>
-      <p:grpSpPr>
+      <p:grpSpPr bwMode="auto">
         <a:xfrm>
           <a:off x="0" y="0"/>
           <a:ext cx="0" cy="0"/>
@@ -796,7 +1275,7 @@
             <p:ph type="title"/>
           </p:nvPr>
         </p:nvSpPr>
-        <p:spPr>
+        <p:spPr bwMode="auto">
           <a:xfrm>
             <a:off x="1523880" y="1122480"/>
             <a:ext cx="9143640" cy="2387160"/>
@@ -806,11 +1285,14 @@
           </a:prstGeom>
         </p:spPr>
         <p:txBody>
-          <a:bodyPr lIns="0" rIns="0" tIns="0" bIns="0" anchor="ctr">
+          <a:bodyPr lIns="0" tIns="0" rIns="0" bIns="0" anchor="ctr">
             <a:noAutofit/>
           </a:bodyPr>
           <a:p>
-            <a:endParaRPr b="0" lang="nl-NL" sz="1800" spc="-1" strike="noStrike">
+            <a:pPr>
+              <a:defRPr/>
+            </a:pPr>
+            <a:endParaRPr lang="nl-NL" sz="1800" b="0" strike="noStrike" spc="-1">
               <a:solidFill>
                 <a:srgbClr val="000000"/>
               </a:solidFill>
@@ -829,7 +1311,7 @@
             <p:ph type="body"/>
           </p:nvPr>
         </p:nvSpPr>
-        <p:spPr>
+        <p:spPr bwMode="auto">
           <a:xfrm>
             <a:off x="609480" y="1604520"/>
             <a:ext cx="5354280" cy="3977280"/>
@@ -839,11 +1321,14 @@
           </a:prstGeom>
         </p:spPr>
         <p:txBody>
-          <a:bodyPr lIns="0" rIns="0" tIns="0" bIns="0">
+          <a:bodyPr lIns="0" tIns="0" rIns="0" bIns="0">
             <a:normAutofit/>
           </a:bodyPr>
           <a:p>
-            <a:endParaRPr b="0" lang="nl-NL" sz="2800" spc="-1" strike="noStrike">
+            <a:pPr>
+              <a:defRPr/>
+            </a:pPr>
+            <a:endParaRPr lang="nl-NL" sz="2800" b="0" strike="noStrike" spc="-1">
               <a:solidFill>
                 <a:srgbClr val="000000"/>
               </a:solidFill>
@@ -862,7 +1347,7 @@
             <p:ph type="body"/>
           </p:nvPr>
         </p:nvSpPr>
-        <p:spPr>
+        <p:spPr bwMode="auto">
           <a:xfrm>
             <a:off x="6231960" y="1604520"/>
             <a:ext cx="5354280" cy="3977280"/>
@@ -872,11 +1357,14 @@
           </a:prstGeom>
         </p:spPr>
         <p:txBody>
-          <a:bodyPr lIns="0" rIns="0" tIns="0" bIns="0">
+          <a:bodyPr lIns="0" tIns="0" rIns="0" bIns="0">
             <a:normAutofit/>
           </a:bodyPr>
           <a:p>
-            <a:endParaRPr b="0" lang="nl-NL" sz="2800" spc="-1" strike="noStrike">
+            <a:pPr>
+              <a:defRPr/>
+            </a:pPr>
+            <a:endParaRPr lang="nl-NL" sz="2800" b="0" strike="noStrike" spc="-1">
               <a:solidFill>
                 <a:srgbClr val="000000"/>
               </a:solidFill>
@@ -887,11 +1375,14 @@
       </p:sp>
     </p:spTree>
   </p:cSld>
+  <p:clrMapOvr>
+    <a:masterClrMapping/>
+  </p:clrMapOvr>
 </p:sldLayout>
 </file>
 
 <file path=ppt/slideLayouts/slideLayout5.xml><?xml version="1.0" encoding="utf-8"?>
-<p:sldLayout xmlns:a="http://schemas.openxmlformats.org/drawingml/2006/main" xmlns:p="http://schemas.openxmlformats.org/presentationml/2006/main" xmlns:r="http://schemas.openxmlformats.org/officeDocument/2006/relationships" xmlns:p14="http://schemas.microsoft.com/office/powerpoint/2010/main" xmlns:p15="http://schemas.microsoft.com/office/powerpoint/2012/main" xmlns:mc="http://schemas.openxmlformats.org/markup-compatibility/2006" type="titleOnly" preserve="1">
+<p:sldLayout xmlns:a="http://schemas.openxmlformats.org/drawingml/2006/main" xmlns:r="http://schemas.openxmlformats.org/officeDocument/2006/relationships" xmlns:p="http://schemas.openxmlformats.org/presentationml/2006/main" xmlns:m="http://schemas.openxmlformats.org/officeDocument/2006/math" xmlns:w="http://schemas.openxmlformats.org/wordprocessingml/2006/main" matchingName="" preserve="1" showMasterPhAnim="0" type="titleOnly" userDrawn="1">
   <p:cSld name="Title Only">
     <p:spTree>
       <p:nvGrpSpPr>
@@ -899,7 +1390,7 @@
         <p:cNvGrpSpPr/>
         <p:nvPr/>
       </p:nvGrpSpPr>
-      <p:grpSpPr>
+      <p:grpSpPr bwMode="auto">
         <a:xfrm>
           <a:off x="0" y="0"/>
           <a:ext cx="0" cy="0"/>
@@ -917,7 +1408,7 @@
             <p:ph type="title"/>
           </p:nvPr>
         </p:nvSpPr>
-        <p:spPr>
+        <p:spPr bwMode="auto">
           <a:xfrm>
             <a:off x="1523880" y="1122480"/>
             <a:ext cx="9143640" cy="2387160"/>
@@ -927,11 +1418,14 @@
           </a:prstGeom>
         </p:spPr>
         <p:txBody>
-          <a:bodyPr lIns="0" rIns="0" tIns="0" bIns="0" anchor="ctr">
+          <a:bodyPr lIns="0" tIns="0" rIns="0" bIns="0" anchor="ctr">
             <a:noAutofit/>
           </a:bodyPr>
           <a:p>
-            <a:endParaRPr b="0" lang="nl-NL" sz="1800" spc="-1" strike="noStrike">
+            <a:pPr>
+              <a:defRPr/>
+            </a:pPr>
+            <a:endParaRPr lang="nl-NL" sz="1800" b="0" strike="noStrike" spc="-1">
               <a:solidFill>
                 <a:srgbClr val="000000"/>
               </a:solidFill>
@@ -942,11 +1436,14 @@
       </p:sp>
     </p:spTree>
   </p:cSld>
+  <p:clrMapOvr>
+    <a:masterClrMapping/>
+  </p:clrMapOvr>
 </p:sldLayout>
 </file>
 
 <file path=ppt/slideLayouts/slideLayout6.xml><?xml version="1.0" encoding="utf-8"?>
-<p:sldLayout xmlns:a="http://schemas.openxmlformats.org/drawingml/2006/main" xmlns:p="http://schemas.openxmlformats.org/presentationml/2006/main" xmlns:r="http://schemas.openxmlformats.org/officeDocument/2006/relationships" xmlns:p14="http://schemas.microsoft.com/office/powerpoint/2010/main" xmlns:p15="http://schemas.microsoft.com/office/powerpoint/2012/main" xmlns:mc="http://schemas.openxmlformats.org/markup-compatibility/2006" type="objOnly" preserve="1">
+<p:sldLayout xmlns:a="http://schemas.openxmlformats.org/drawingml/2006/main" xmlns:r="http://schemas.openxmlformats.org/officeDocument/2006/relationships" xmlns:p="http://schemas.openxmlformats.org/presentationml/2006/main" xmlns:m="http://schemas.openxmlformats.org/officeDocument/2006/math" xmlns:w="http://schemas.openxmlformats.org/wordprocessingml/2006/main" matchingName="" preserve="1" showMasterPhAnim="0" type="objOnly" userDrawn="1">
   <p:cSld name="Centered Text">
     <p:spTree>
       <p:nvGrpSpPr>
@@ -954,7 +1451,7 @@
         <p:cNvGrpSpPr/>
         <p:nvPr/>
       </p:nvGrpSpPr>
-      <p:grpSpPr>
+      <p:grpSpPr bwMode="auto">
         <a:xfrm>
           <a:off x="0" y="0"/>
           <a:ext cx="0" cy="0"/>
@@ -972,7 +1469,7 @@
             <p:ph type="subTitle"/>
           </p:nvPr>
         </p:nvSpPr>
-        <p:spPr>
+        <p:spPr bwMode="auto">
           <a:xfrm>
             <a:off x="1523880" y="1122480"/>
             <a:ext cx="9143640" cy="11066760"/>
@@ -982,12 +1479,14 @@
           </a:prstGeom>
         </p:spPr>
         <p:txBody>
-          <a:bodyPr lIns="0" rIns="0" tIns="0" bIns="0" anchor="ctr">
+          <a:bodyPr lIns="0" tIns="0" rIns="0" bIns="0" anchor="ctr">
             <a:noAutofit/>
           </a:bodyPr>
           <a:p>
-            <a:pPr algn="ctr"/>
-            <a:endParaRPr b="0" lang="en-US" sz="3200" spc="-1" strike="noStrike">
+            <a:pPr algn="ctr">
+              <a:defRPr/>
+            </a:pPr>
+            <a:endParaRPr lang="en-US" sz="3200" b="0" strike="noStrike" spc="-1">
               <a:latin typeface="Arial"/>
             </a:endParaRPr>
           </a:p>
@@ -995,11 +1494,14 @@
       </p:sp>
     </p:spTree>
   </p:cSld>
+  <p:clrMapOvr>
+    <a:masterClrMapping/>
+  </p:clrMapOvr>
 </p:sldLayout>
 </file>
 
 <file path=ppt/slideLayouts/slideLayout7.xml><?xml version="1.0" encoding="utf-8"?>
-<p:sldLayout xmlns:a="http://schemas.openxmlformats.org/drawingml/2006/main" xmlns:p="http://schemas.openxmlformats.org/presentationml/2006/main" xmlns:r="http://schemas.openxmlformats.org/officeDocument/2006/relationships" xmlns:p14="http://schemas.microsoft.com/office/powerpoint/2010/main" xmlns:p15="http://schemas.microsoft.com/office/powerpoint/2012/main" xmlns:mc="http://schemas.openxmlformats.org/markup-compatibility/2006" type="twoObjAndObj" preserve="1">
+<p:sldLayout xmlns:a="http://schemas.openxmlformats.org/drawingml/2006/main" xmlns:r="http://schemas.openxmlformats.org/officeDocument/2006/relationships" xmlns:p="http://schemas.openxmlformats.org/presentationml/2006/main" xmlns:m="http://schemas.openxmlformats.org/officeDocument/2006/math" xmlns:w="http://schemas.openxmlformats.org/wordprocessingml/2006/main" matchingName="" preserve="1" showMasterPhAnim="0" type="twoObjAndObj" userDrawn="1">
   <p:cSld name="Title, 2 Content and Content">
     <p:spTree>
       <p:nvGrpSpPr>
@@ -1007,7 +1509,7 @@
         <p:cNvGrpSpPr/>
         <p:nvPr/>
       </p:nvGrpSpPr>
-      <p:grpSpPr>
+      <p:grpSpPr bwMode="auto">
         <a:xfrm>
           <a:off x="0" y="0"/>
           <a:ext cx="0" cy="0"/>
@@ -1025,7 +1527,7 @@
             <p:ph type="title"/>
           </p:nvPr>
         </p:nvSpPr>
-        <p:spPr>
+        <p:spPr bwMode="auto">
           <a:xfrm>
             <a:off x="1523880" y="1122480"/>
             <a:ext cx="9143640" cy="2387160"/>
@@ -1035,11 +1537,14 @@
           </a:prstGeom>
         </p:spPr>
         <p:txBody>
-          <a:bodyPr lIns="0" rIns="0" tIns="0" bIns="0" anchor="ctr">
+          <a:bodyPr lIns="0" tIns="0" rIns="0" bIns="0" anchor="ctr">
             <a:noAutofit/>
           </a:bodyPr>
           <a:p>
-            <a:endParaRPr b="0" lang="nl-NL" sz="1800" spc="-1" strike="noStrike">
+            <a:pPr>
+              <a:defRPr/>
+            </a:pPr>
+            <a:endParaRPr lang="nl-NL" sz="1800" b="0" strike="noStrike" spc="-1">
               <a:solidFill>
                 <a:srgbClr val="000000"/>
               </a:solidFill>
@@ -1058,7 +1563,7 @@
             <p:ph type="body"/>
           </p:nvPr>
         </p:nvSpPr>
-        <p:spPr>
+        <p:spPr bwMode="auto">
           <a:xfrm>
             <a:off x="609480" y="1604520"/>
             <a:ext cx="5354280" cy="1896840"/>
@@ -1068,11 +1573,14 @@
           </a:prstGeom>
         </p:spPr>
         <p:txBody>
-          <a:bodyPr lIns="0" rIns="0" tIns="0" bIns="0">
+          <a:bodyPr lIns="0" tIns="0" rIns="0" bIns="0">
             <a:normAutofit/>
           </a:bodyPr>
           <a:p>
-            <a:endParaRPr b="0" lang="nl-NL" sz="2800" spc="-1" strike="noStrike">
+            <a:pPr>
+              <a:defRPr/>
+            </a:pPr>
+            <a:endParaRPr lang="nl-NL" sz="2800" b="0" strike="noStrike" spc="-1">
               <a:solidFill>
                 <a:srgbClr val="000000"/>
               </a:solidFill>
@@ -1091,7 +1599,7 @@
             <p:ph type="body"/>
           </p:nvPr>
         </p:nvSpPr>
-        <p:spPr>
+        <p:spPr bwMode="auto">
           <a:xfrm>
             <a:off x="6231960" y="1604520"/>
             <a:ext cx="5354280" cy="3977280"/>
@@ -1101,11 +1609,14 @@
           </a:prstGeom>
         </p:spPr>
         <p:txBody>
-          <a:bodyPr lIns="0" rIns="0" tIns="0" bIns="0">
+          <a:bodyPr lIns="0" tIns="0" rIns="0" bIns="0">
             <a:normAutofit/>
           </a:bodyPr>
           <a:p>
-            <a:endParaRPr b="0" lang="nl-NL" sz="2800" spc="-1" strike="noStrike">
+            <a:pPr>
+              <a:defRPr/>
+            </a:pPr>
+            <a:endParaRPr lang="nl-NL" sz="2800" b="0" strike="noStrike" spc="-1">
               <a:solidFill>
                 <a:srgbClr val="000000"/>
               </a:solidFill>
@@ -1124,7 +1635,7 @@
             <p:ph type="body"/>
           </p:nvPr>
         </p:nvSpPr>
-        <p:spPr>
+        <p:spPr bwMode="auto">
           <a:xfrm>
             <a:off x="609480" y="3682080"/>
             <a:ext cx="5354280" cy="1896840"/>
@@ -1134,11 +1645,14 @@
           </a:prstGeom>
         </p:spPr>
         <p:txBody>
-          <a:bodyPr lIns="0" rIns="0" tIns="0" bIns="0">
+          <a:bodyPr lIns="0" tIns="0" rIns="0" bIns="0">
             <a:normAutofit/>
           </a:bodyPr>
           <a:p>
-            <a:endParaRPr b="0" lang="nl-NL" sz="2800" spc="-1" strike="noStrike">
+            <a:pPr>
+              <a:defRPr/>
+            </a:pPr>
+            <a:endParaRPr lang="nl-NL" sz="2800" b="0" strike="noStrike" spc="-1">
               <a:solidFill>
                 <a:srgbClr val="000000"/>
               </a:solidFill>
@@ -1149,11 +1663,14 @@
       </p:sp>
     </p:spTree>
   </p:cSld>
+  <p:clrMapOvr>
+    <a:masterClrMapping/>
+  </p:clrMapOvr>
 </p:sldLayout>
 </file>
 
 <file path=ppt/slideLayouts/slideLayout8.xml><?xml version="1.0" encoding="utf-8"?>
-<p:sldLayout xmlns:a="http://schemas.openxmlformats.org/drawingml/2006/main" xmlns:p="http://schemas.openxmlformats.org/presentationml/2006/main" xmlns:r="http://schemas.openxmlformats.org/officeDocument/2006/relationships" xmlns:p14="http://schemas.microsoft.com/office/powerpoint/2010/main" xmlns:p15="http://schemas.microsoft.com/office/powerpoint/2012/main" xmlns:mc="http://schemas.openxmlformats.org/markup-compatibility/2006" type="objAndTwoObj" preserve="1">
+<p:sldLayout xmlns:a="http://schemas.openxmlformats.org/drawingml/2006/main" xmlns:r="http://schemas.openxmlformats.org/officeDocument/2006/relationships" xmlns:p="http://schemas.openxmlformats.org/presentationml/2006/main" xmlns:m="http://schemas.openxmlformats.org/officeDocument/2006/math" xmlns:w="http://schemas.openxmlformats.org/wordprocessingml/2006/main" matchingName="" preserve="1" showMasterPhAnim="0" type="objAndTwoObj" userDrawn="1">
   <p:cSld name="Title Content and 2 Content">
     <p:spTree>
       <p:nvGrpSpPr>
@@ -1161,7 +1678,7 @@
         <p:cNvGrpSpPr/>
         <p:nvPr/>
       </p:nvGrpSpPr>
-      <p:grpSpPr>
+      <p:grpSpPr bwMode="auto">
         <a:xfrm>
           <a:off x="0" y="0"/>
           <a:ext cx="0" cy="0"/>
@@ -1179,7 +1696,7 @@
             <p:ph type="title"/>
           </p:nvPr>
         </p:nvSpPr>
-        <p:spPr>
+        <p:spPr bwMode="auto">
           <a:xfrm>
             <a:off x="1523880" y="1122480"/>
             <a:ext cx="9143640" cy="2387160"/>
@@ -1189,11 +1706,14 @@
           </a:prstGeom>
         </p:spPr>
         <p:txBody>
-          <a:bodyPr lIns="0" rIns="0" tIns="0" bIns="0" anchor="ctr">
+          <a:bodyPr lIns="0" tIns="0" rIns="0" bIns="0" anchor="ctr">
             <a:noAutofit/>
           </a:bodyPr>
           <a:p>
-            <a:endParaRPr b="0" lang="nl-NL" sz="1800" spc="-1" strike="noStrike">
+            <a:pPr>
+              <a:defRPr/>
+            </a:pPr>
+            <a:endParaRPr lang="nl-NL" sz="1800" b="0" strike="noStrike" spc="-1">
               <a:solidFill>
                 <a:srgbClr val="000000"/>
               </a:solidFill>
@@ -1212,7 +1732,7 @@
             <p:ph type="body"/>
           </p:nvPr>
         </p:nvSpPr>
-        <p:spPr>
+        <p:spPr bwMode="auto">
           <a:xfrm>
             <a:off x="609480" y="1604520"/>
             <a:ext cx="5354280" cy="3977280"/>
@@ -1222,11 +1742,14 @@
           </a:prstGeom>
         </p:spPr>
         <p:txBody>
-          <a:bodyPr lIns="0" rIns="0" tIns="0" bIns="0">
+          <a:bodyPr lIns="0" tIns="0" rIns="0" bIns="0">
             <a:normAutofit/>
           </a:bodyPr>
           <a:p>
-            <a:endParaRPr b="0" lang="nl-NL" sz="2800" spc="-1" strike="noStrike">
+            <a:pPr>
+              <a:defRPr/>
+            </a:pPr>
+            <a:endParaRPr lang="nl-NL" sz="2800" b="0" strike="noStrike" spc="-1">
               <a:solidFill>
                 <a:srgbClr val="000000"/>
               </a:solidFill>
@@ -1245,7 +1768,7 @@
             <p:ph type="body"/>
           </p:nvPr>
         </p:nvSpPr>
-        <p:spPr>
+        <p:spPr bwMode="auto">
           <a:xfrm>
             <a:off x="6231960" y="1604520"/>
             <a:ext cx="5354280" cy="1896840"/>
@@ -1255,11 +1778,14 @@
           </a:prstGeom>
         </p:spPr>
         <p:txBody>
-          <a:bodyPr lIns="0" rIns="0" tIns="0" bIns="0">
+          <a:bodyPr lIns="0" tIns="0" rIns="0" bIns="0">
             <a:normAutofit/>
           </a:bodyPr>
           <a:p>
-            <a:endParaRPr b="0" lang="nl-NL" sz="2800" spc="-1" strike="noStrike">
+            <a:pPr>
+              <a:defRPr/>
+            </a:pPr>
+            <a:endParaRPr lang="nl-NL" sz="2800" b="0" strike="noStrike" spc="-1">
               <a:solidFill>
                 <a:srgbClr val="000000"/>
               </a:solidFill>
@@ -1278,7 +1804,7 @@
             <p:ph type="body"/>
           </p:nvPr>
         </p:nvSpPr>
-        <p:spPr>
+        <p:spPr bwMode="auto">
           <a:xfrm>
             <a:off x="6231960" y="3682080"/>
             <a:ext cx="5354280" cy="1896840"/>
@@ -1288,11 +1814,14 @@
           </a:prstGeom>
         </p:spPr>
         <p:txBody>
-          <a:bodyPr lIns="0" rIns="0" tIns="0" bIns="0">
+          <a:bodyPr lIns="0" tIns="0" rIns="0" bIns="0">
             <a:normAutofit/>
           </a:bodyPr>
           <a:p>
-            <a:endParaRPr b="0" lang="nl-NL" sz="2800" spc="-1" strike="noStrike">
+            <a:pPr>
+              <a:defRPr/>
+            </a:pPr>
+            <a:endParaRPr lang="nl-NL" sz="2800" b="0" strike="noStrike" spc="-1">
               <a:solidFill>
                 <a:srgbClr val="000000"/>
               </a:solidFill>
@@ -1303,11 +1832,14 @@
       </p:sp>
     </p:spTree>
   </p:cSld>
+  <p:clrMapOvr>
+    <a:masterClrMapping/>
+  </p:clrMapOvr>
 </p:sldLayout>
 </file>
 
 <file path=ppt/slideLayouts/slideLayout9.xml><?xml version="1.0" encoding="utf-8"?>
-<p:sldLayout xmlns:a="http://schemas.openxmlformats.org/drawingml/2006/main" xmlns:p="http://schemas.openxmlformats.org/presentationml/2006/main" xmlns:r="http://schemas.openxmlformats.org/officeDocument/2006/relationships" xmlns:p14="http://schemas.microsoft.com/office/powerpoint/2010/main" xmlns:p15="http://schemas.microsoft.com/office/powerpoint/2012/main" xmlns:mc="http://schemas.openxmlformats.org/markup-compatibility/2006" type="twoObjOverTx" preserve="1">
+<p:sldLayout xmlns:a="http://schemas.openxmlformats.org/drawingml/2006/main" xmlns:r="http://schemas.openxmlformats.org/officeDocument/2006/relationships" xmlns:p="http://schemas.openxmlformats.org/presentationml/2006/main" xmlns:m="http://schemas.openxmlformats.org/officeDocument/2006/math" xmlns:w="http://schemas.openxmlformats.org/wordprocessingml/2006/main" matchingName="" preserve="1" showMasterPhAnim="0" type="twoObjOverTx" userDrawn="1">
   <p:cSld name="Title, 2 Content over Content">
     <p:spTree>
       <p:nvGrpSpPr>
@@ -1315,7 +1847,7 @@
         <p:cNvGrpSpPr/>
         <p:nvPr/>
       </p:nvGrpSpPr>
-      <p:grpSpPr>
+      <p:grpSpPr bwMode="auto">
         <a:xfrm>
           <a:off x="0" y="0"/>
           <a:ext cx="0" cy="0"/>
@@ -1333,7 +1865,7 @@
             <p:ph type="title"/>
           </p:nvPr>
         </p:nvSpPr>
-        <p:spPr>
+        <p:spPr bwMode="auto">
           <a:xfrm>
             <a:off x="1523880" y="1122480"/>
             <a:ext cx="9143640" cy="2387160"/>
@@ -1343,11 +1875,14 @@
           </a:prstGeom>
         </p:spPr>
         <p:txBody>
-          <a:bodyPr lIns="0" rIns="0" tIns="0" bIns="0" anchor="ctr">
+          <a:bodyPr lIns="0" tIns="0" rIns="0" bIns="0" anchor="ctr">
             <a:noAutofit/>
           </a:bodyPr>
           <a:p>
-            <a:endParaRPr b="0" lang="nl-NL" sz="1800" spc="-1" strike="noStrike">
+            <a:pPr>
+              <a:defRPr/>
+            </a:pPr>
+            <a:endParaRPr lang="nl-NL" sz="1800" b="0" strike="noStrike" spc="-1">
               <a:solidFill>
                 <a:srgbClr val="000000"/>
               </a:solidFill>
@@ -1366,7 +1901,7 @@
             <p:ph type="body"/>
           </p:nvPr>
         </p:nvSpPr>
-        <p:spPr>
+        <p:spPr bwMode="auto">
           <a:xfrm>
             <a:off x="609480" y="1604520"/>
             <a:ext cx="5354280" cy="1896840"/>
@@ -1376,11 +1911,14 @@
           </a:prstGeom>
         </p:spPr>
         <p:txBody>
-          <a:bodyPr lIns="0" rIns="0" tIns="0" bIns="0">
+          <a:bodyPr lIns="0" tIns="0" rIns="0" bIns="0">
             <a:normAutofit/>
           </a:bodyPr>
           <a:p>
-            <a:endParaRPr b="0" lang="nl-NL" sz="2800" spc="-1" strike="noStrike">
+            <a:pPr>
+              <a:defRPr/>
+            </a:pPr>
+            <a:endParaRPr lang="nl-NL" sz="2800" b="0" strike="noStrike" spc="-1">
               <a:solidFill>
                 <a:srgbClr val="000000"/>
               </a:solidFill>
@@ -1399,7 +1937,7 @@
             <p:ph type="body"/>
           </p:nvPr>
         </p:nvSpPr>
-        <p:spPr>
+        <p:spPr bwMode="auto">
           <a:xfrm>
             <a:off x="6231960" y="1604520"/>
             <a:ext cx="5354280" cy="1896840"/>
@@ -1409,11 +1947,14 @@
           </a:prstGeom>
         </p:spPr>
         <p:txBody>
-          <a:bodyPr lIns="0" rIns="0" tIns="0" bIns="0">
+          <a:bodyPr lIns="0" tIns="0" rIns="0" bIns="0">
             <a:normAutofit/>
           </a:bodyPr>
           <a:p>
-            <a:endParaRPr b="0" lang="nl-NL" sz="2800" spc="-1" strike="noStrike">
+            <a:pPr>
+              <a:defRPr/>
+            </a:pPr>
+            <a:endParaRPr lang="nl-NL" sz="2800" b="0" strike="noStrike" spc="-1">
               <a:solidFill>
                 <a:srgbClr val="000000"/>
               </a:solidFill>
@@ -1432,7 +1973,7 @@
             <p:ph type="body"/>
           </p:nvPr>
         </p:nvSpPr>
-        <p:spPr>
+        <p:spPr bwMode="auto">
           <a:xfrm>
             <a:off x="609480" y="3682080"/>
             <a:ext cx="10972440" cy="1896840"/>
@@ -1442,11 +1983,14 @@
           </a:prstGeom>
         </p:spPr>
         <p:txBody>
-          <a:bodyPr lIns="0" rIns="0" tIns="0" bIns="0">
+          <a:bodyPr lIns="0" tIns="0" rIns="0" bIns="0">
             <a:normAutofit/>
           </a:bodyPr>
           <a:p>
-            <a:endParaRPr b="0" lang="nl-NL" sz="2800" spc="-1" strike="noStrike">
+            <a:pPr>
+              <a:defRPr/>
+            </a:pPr>
+            <a:endParaRPr lang="nl-NL" sz="2800" b="0" strike="noStrike" spc="-1">
               <a:solidFill>
                 <a:srgbClr val="000000"/>
               </a:solidFill>
@@ -1457,16 +2001,19 @@
       </p:sp>
     </p:spTree>
   </p:cSld>
+  <p:clrMapOvr>
+    <a:masterClrMapping/>
+  </p:clrMapOvr>
 </p:sldLayout>
 </file>
 
 <file path=ppt/slideMasters/slideMaster1.xml><?xml version="1.0" encoding="utf-8"?>
-<p:sldMaster xmlns:a="http://schemas.openxmlformats.org/drawingml/2006/main" xmlns:p="http://schemas.openxmlformats.org/presentationml/2006/main" xmlns:r="http://schemas.openxmlformats.org/officeDocument/2006/relationships" xmlns:p14="http://schemas.microsoft.com/office/powerpoint/2010/main" xmlns:p15="http://schemas.microsoft.com/office/powerpoint/2012/main" xmlns:mc="http://schemas.openxmlformats.org/markup-compatibility/2006">
-  <p:cSld>
+<p:sldMaster xmlns:a="http://schemas.openxmlformats.org/drawingml/2006/main" xmlns:r="http://schemas.openxmlformats.org/officeDocument/2006/relationships" xmlns:p="http://schemas.openxmlformats.org/presentationml/2006/main" xmlns:m="http://schemas.openxmlformats.org/officeDocument/2006/math" xmlns:w="http://schemas.openxmlformats.org/wordprocessingml/2006/main" preserve="0">
+  <p:cSld name="">
     <p:bg>
-      <p:bgPr>
+      <p:bgPr shadeToTitle="0">
         <a:solidFill>
-          <a:srgbClr val="ffffff"/>
+          <a:srgbClr val="FFFFFF"/>
         </a:solidFill>
       </p:bgPr>
     </p:bg>
@@ -1476,7 +2023,7 @@
         <p:cNvGrpSpPr/>
         <p:nvPr/>
       </p:nvGrpSpPr>
-      <p:grpSpPr>
+      <p:grpSpPr bwMode="auto">
         <a:xfrm>
           <a:off x="0" y="0"/>
           <a:ext cx="0" cy="0"/>
@@ -1494,7 +2041,7 @@
             <p:ph type="title"/>
           </p:nvPr>
         </p:nvSpPr>
-        <p:spPr>
+        <p:spPr bwMode="auto">
           <a:xfrm>
             <a:off x="1523880" y="1122480"/>
             <a:ext cx="9143640" cy="2387160"/>
@@ -1512,9 +2059,10 @@
               <a:lnSpc>
                 <a:spcPct val="90000"/>
               </a:lnSpc>
+              <a:defRPr/>
             </a:pPr>
             <a:r>
-              <a:rPr b="0" lang="en-US" sz="6000" spc="-1" strike="noStrike">
+              <a:rPr lang="en-US" sz="6000" b="0" strike="noStrike" spc="-1">
                 <a:solidFill>
                   <a:srgbClr val="000000"/>
                 </a:solidFill>
@@ -1522,7 +2070,7 @@
               </a:rPr>
               <a:t>Click to edit Master title style</a:t>
             </a:r>
-            <a:endParaRPr b="0" lang="nl-NL" sz="6000" spc="-1" strike="noStrike">
+            <a:endParaRPr lang="nl-NL" sz="6000" b="0" strike="noStrike" spc="-1">
               <a:solidFill>
                 <a:srgbClr val="000000"/>
               </a:solidFill>
@@ -1541,7 +2089,7 @@
             <p:ph type="dt"/>
           </p:nvPr>
         </p:nvSpPr>
-        <p:spPr>
+        <p:spPr bwMode="auto">
           <a:xfrm>
             <a:off x="838080" y="6356520"/>
             <a:ext cx="2742840" cy="364680"/>
@@ -1559,17 +2107,18 @@
               <a:lnSpc>
                 <a:spcPct val="100000"/>
               </a:lnSpc>
+              <a:defRPr/>
             </a:pPr>
             <a:fld id="{135BC1B5-65E7-4FE0-BE59-2C82A0CFD7EC}" type="datetime">
-              <a:rPr b="0" lang="nl-NL" sz="1200" spc="-1" strike="noStrike">
+              <a:rPr lang="nl-NL" sz="1200" b="0" strike="noStrike" spc="-1">
                 <a:solidFill>
-                  <a:srgbClr val="8b8b8b"/>
+                  <a:srgbClr val="8B8B8B"/>
                 </a:solidFill>
                 <a:latin typeface="Calibri"/>
               </a:rPr>
               <a:t>9-08-21</a:t>
             </a:fld>
-            <a:endParaRPr b="0" lang="en-US" sz="1200" spc="-1" strike="noStrike">
+            <a:endParaRPr lang="en-US" sz="1200" b="0" strike="noStrike" spc="-1">
               <a:latin typeface="Times New Roman"/>
             </a:endParaRPr>
           </a:p>
@@ -1585,7 +2134,7 @@
             <p:ph type="ftr"/>
           </p:nvPr>
         </p:nvSpPr>
-        <p:spPr>
+        <p:spPr bwMode="auto">
           <a:xfrm>
             <a:off x="4038480" y="6356520"/>
             <a:ext cx="4114440" cy="364680"/>
@@ -1599,7 +2148,10 @@
             <a:noAutofit/>
           </a:bodyPr>
           <a:p>
-            <a:endParaRPr b="0" lang="en-US" sz="2400" spc="-1" strike="noStrike">
+            <a:pPr>
+              <a:defRPr/>
+            </a:pPr>
+            <a:endParaRPr lang="en-US" sz="2400" b="0" strike="noStrike" spc="-1">
               <a:latin typeface="Times New Roman"/>
             </a:endParaRPr>
           </a:p>
@@ -1615,7 +2167,7 @@
             <p:ph type="sldNum"/>
           </p:nvPr>
         </p:nvSpPr>
-        <p:spPr>
+        <p:spPr bwMode="auto">
           <a:xfrm>
             <a:off x="8610480" y="6356520"/>
             <a:ext cx="2742840" cy="364680"/>
@@ -1633,17 +2185,18 @@
               <a:lnSpc>
                 <a:spcPct val="100000"/>
               </a:lnSpc>
+              <a:defRPr/>
             </a:pPr>
             <a:fld id="{06446444-2FD0-47C5-BE93-54F18561C434}" type="slidenum">
-              <a:rPr b="0" lang="nl-NL" sz="1200" spc="-1" strike="noStrike">
+              <a:rPr lang="nl-NL" sz="1200" b="0" strike="noStrike" spc="-1">
                 <a:solidFill>
-                  <a:srgbClr val="8b8b8b"/>
+                  <a:srgbClr val="8B8B8B"/>
                 </a:solidFill>
                 <a:latin typeface="Calibri"/>
               </a:rPr>
               <a:t>&lt;number&gt;</a:t>
             </a:fld>
-            <a:endParaRPr b="0" lang="en-US" sz="1200" spc="-1" strike="noStrike">
+            <a:endParaRPr lang="en-US" sz="1200" b="0" strike="noStrike" spc="-1">
               <a:latin typeface="Times New Roman"/>
             </a:endParaRPr>
           </a:p>
@@ -1651,34 +2204,34 @@
       </p:sp>
     </p:spTree>
   </p:cSld>
-  <p:clrMap bg1="lt1" bg2="lt2" tx1="dk1" tx2="dk2" accent1="accent1" accent2="accent2" accent3="accent3" accent4="accent4" accent5="accent5" accent6="accent6" hlink="hlink" folHlink="folHlink"/>
+  <p:clrMap bg1="lt1" tx1="dk1" bg2="lt2" tx2="dk2" accent1="accent1" accent2="accent2" accent3="accent3" accent4="accent4" accent5="accent5" accent6="accent6" hlink="hlink" folHlink="folHlink"/>
   <p:sldLayoutIdLst>
-    <p:sldLayoutId id="2147483649" r:id="rId2"/>
-    <p:sldLayoutId id="2147483650" r:id="rId3"/>
-    <p:sldLayoutId id="2147483651" r:id="rId4"/>
-    <p:sldLayoutId id="2147483652" r:id="rId5"/>
-    <p:sldLayoutId id="2147483653" r:id="rId6"/>
-    <p:sldLayoutId id="2147483654" r:id="rId7"/>
-    <p:sldLayoutId id="2147483655" r:id="rId8"/>
-    <p:sldLayoutId id="2147483656" r:id="rId9"/>
-    <p:sldLayoutId id="2147483657" r:id="rId10"/>
-    <p:sldLayoutId id="2147483658" r:id="rId11"/>
-    <p:sldLayoutId id="2147483659" r:id="rId12"/>
-    <p:sldLayoutId id="2147483660" r:id="rId13"/>
+    <p:sldLayoutId id="2147483649" r:id="rId1"/>
+    <p:sldLayoutId id="2147483650" r:id="rId2"/>
+    <p:sldLayoutId id="2147483651" r:id="rId3"/>
+    <p:sldLayoutId id="2147483652" r:id="rId4"/>
+    <p:sldLayoutId id="2147483653" r:id="rId5"/>
+    <p:sldLayoutId id="2147483654" r:id="rId6"/>
+    <p:sldLayoutId id="2147483655" r:id="rId7"/>
+    <p:sldLayoutId id="2147483656" r:id="rId8"/>
+    <p:sldLayoutId id="2147483657" r:id="rId9"/>
+    <p:sldLayoutId id="2147483658" r:id="rId10"/>
+    <p:sldLayoutId id="2147483659" r:id="rId11"/>
+    <p:sldLayoutId id="2147483660" r:id="rId12"/>
   </p:sldLayoutIdLst>
 </p:sldMaster>
 </file>
 
 <file path=ppt/slides/slide1.xml><?xml version="1.0" encoding="utf-8"?>
-<p:sld xmlns:a="http://schemas.openxmlformats.org/drawingml/2006/main" xmlns:p="http://schemas.openxmlformats.org/presentationml/2006/main" xmlns:r="http://schemas.openxmlformats.org/officeDocument/2006/relationships" xmlns:p14="http://schemas.microsoft.com/office/powerpoint/2010/main" xmlns:p15="http://schemas.microsoft.com/office/powerpoint/2012/main" xmlns:mc="http://schemas.openxmlformats.org/markup-compatibility/2006">
-  <p:cSld>
+<p:sld xmlns:a="http://schemas.openxmlformats.org/drawingml/2006/main" xmlns:r="http://schemas.openxmlformats.org/officeDocument/2006/relationships" xmlns:p="http://schemas.openxmlformats.org/presentationml/2006/main" xmlns:m="http://schemas.openxmlformats.org/officeDocument/2006/math" xmlns:w="http://schemas.openxmlformats.org/wordprocessingml/2006/main" showMasterPhAnim="0" show="1">
+  <p:cSld name="">
     <p:spTree>
       <p:nvGrpSpPr>
         <p:cNvPr id="1" name=""/>
         <p:cNvGrpSpPr/>
         <p:nvPr/>
       </p:nvGrpSpPr>
-      <p:grpSpPr>
+      <p:grpSpPr bwMode="auto">
         <a:xfrm>
           <a:off x="0" y="0"/>
           <a:ext cx="0" cy="0"/>
@@ -1693,22 +2246,10 @@
           <p:nvPr/>
         </p:nvPicPr>
         <p:blipFill>
-          <a:blip r:embed="rId1">
-            <a:extLst>
-              <a:ext uri="{BEBA8EAE-BF5A-486C-A8C5-ECC9F3942E4B}">
-                <a14:imgProps xmlns:a14="http://schemas.microsoft.com/office/drawing/2010/main">
-                  <a14:imgLayer r:embed="rId2">
-                    <a14:imgEffect>
-                      <a14:saturation sat="0"/>
-                    </a14:imgEffect>
-                  </a14:imgLayer>
-                </a14:imgProps>
-              </a:ext>
-            </a:extLst>
-          </a:blip>
+          <a:blip r:embed="rId3"/>
           <a:stretch/>
         </p:blipFill>
-        <p:spPr>
+        <p:spPr bwMode="auto">
           <a:xfrm>
             <a:off x="847800" y="1152360"/>
             <a:ext cx="4419360" cy="4419360"/>
@@ -1727,7 +2268,7 @@
           <p:cNvSpPr txBox="1"/>
           <p:nvPr/>
         </p:nvSpPr>
-        <p:spPr>
+        <p:spPr bwMode="auto">
           <a:xfrm>
             <a:off x="1562040" y="865080"/>
             <a:ext cx="9143640" cy="2387160"/>
@@ -1749,9 +2290,10 @@
               <a:lnSpc>
                 <a:spcPct val="90000"/>
               </a:lnSpc>
+              <a:defRPr/>
             </a:pPr>
             <a:r>
-              <a:rPr b="1" lang="en-US" sz="6100" spc="-1" strike="noStrike">
+              <a:rPr lang="en-US" sz="6100" b="1" strike="noStrike" spc="-1">
                 <a:solidFill>
                   <a:srgbClr val="000000"/>
                 </a:solidFill>
@@ -1759,7 +2301,7 @@
               </a:rPr>
               <a:t>MPS Introduction Course</a:t>
             </a:r>
-            <a:endParaRPr b="0" lang="nl-NL" sz="6100" spc="-1" strike="noStrike">
+            <a:endParaRPr lang="nl-NL" sz="6100" b="0" strike="noStrike" spc="-1">
               <a:solidFill>
                 <a:srgbClr val="000000"/>
               </a:solidFill>
@@ -1774,7 +2316,7 @@
           <p:cNvSpPr txBox="1"/>
           <p:nvPr/>
         </p:nvSpPr>
-        <p:spPr>
+        <p:spPr bwMode="auto">
           <a:xfrm>
             <a:off x="1428840" y="3030480"/>
             <a:ext cx="9467640" cy="1655280"/>
@@ -1800,19 +2342,20 @@
                 <a:spcPts val="1001"/>
               </a:spcBef>
               <a:tabLst>
-                <a:tab algn="l" pos="0"/>
+                <a:tab pos="0" algn="l"/>
               </a:tabLst>
+              <a:defRPr/>
             </a:pPr>
             <a:r>
-              <a:rPr b="1" lang="en-US" sz="2500" spc="-1" strike="noStrike">
+              <a:rPr lang="en-US" sz="2500" b="1" strike="noStrike" spc="-1">
                 <a:solidFill>
                   <a:srgbClr val="595959"/>
                 </a:solidFill>
                 <a:latin typeface="Calibri"/>
               </a:rPr>
-              <a:t>MPS 2021.1.x + mbeddr.platform / MPS Extensions + KernelF</a:t>
+              <a:t>MPS 2022.2.x + mbeddr.platform / MPS Extensions + KernelF</a:t>
             </a:r>
-            <a:endParaRPr b="0" lang="en-US" sz="2500" spc="-1" strike="noStrike">
+            <a:endParaRPr lang="en-US" sz="2500" b="0" strike="noStrike" spc="-1">
               <a:latin typeface="Arial"/>
             </a:endParaRPr>
           </a:p>
@@ -1825,11 +2368,11 @@
           <p:nvPr/>
         </p:nvPicPr>
         <p:blipFill>
-          <a:blip r:embed="rId3"/>
-          <a:srcRect l="37167" t="23998" r="36999" b="23502"/>
+          <a:blip r:embed="rId4"/>
+          <a:srcRect l="37167" t="23998" r="36999" b="23501"/>
           <a:stretch/>
         </p:blipFill>
-        <p:spPr>
+        <p:spPr bwMode="auto">
           <a:xfrm>
             <a:off x="2158200" y="3448800"/>
             <a:ext cx="306000" cy="310680"/>
@@ -1848,7 +2391,7 @@
           <p:cNvSpPr/>
           <p:nvPr/>
         </p:nvSpPr>
-        <p:spPr>
+        <p:spPr bwMode="auto">
           <a:xfrm>
             <a:off x="2466000" y="3400200"/>
             <a:ext cx="5432760" cy="395280"/>
@@ -1868,7 +2411,7 @@
           <a:fontRef idx="minor"/>
         </p:style>
         <p:txBody>
-          <a:bodyPr wrap="none" lIns="90000" rIns="90000" tIns="45000" bIns="45000">
+          <a:bodyPr wrap="none" lIns="90000" tIns="45000" rIns="90000" bIns="45000">
             <a:spAutoFit/>
           </a:bodyPr>
           <a:p>
@@ -1876,9 +2419,10 @@
               <a:lnSpc>
                 <a:spcPct val="100000"/>
               </a:lnSpc>
+              <a:defRPr/>
             </a:pPr>
             <a:r>
-              <a:rPr b="0" lang="nl-NL" sz="2000" spc="-1" strike="noStrike">
+              <a:rPr lang="nl-NL" sz="2000" b="0" strike="noStrike" spc="-1">
                 <a:solidFill>
                   <a:srgbClr val="000000"/>
                 </a:solidFill>
@@ -1886,7 +2430,7 @@
               </a:rPr>
               <a:t>https://github.com/markusvoelter/mpsintrocourse</a:t>
             </a:r>
-            <a:endParaRPr b="0" lang="en-US" sz="2000" spc="-1" strike="noStrike">
+            <a:endParaRPr lang="en-US" sz="2000" b="0" strike="noStrike" spc="-1">
               <a:latin typeface="Arial"/>
             </a:endParaRPr>
           </a:p>
@@ -1899,10 +2443,10 @@
           <p:nvPr/>
         </p:nvPicPr>
         <p:blipFill>
-          <a:blip r:embed="rId4"/>
+          <a:blip r:embed="rId5"/>
           <a:stretch/>
         </p:blipFill>
-        <p:spPr>
+        <p:spPr bwMode="auto">
           <a:xfrm>
             <a:off x="7929360" y="933480"/>
             <a:ext cx="3190680" cy="828000"/>
@@ -1922,11 +2466,11 @@
           <p:nvPr/>
         </p:nvPicPr>
         <p:blipFill>
-          <a:blip r:embed="rId5"/>
-          <a:srcRect l="32382" t="0" r="0" b="0"/>
+          <a:blip r:embed="rId6"/>
+          <a:srcRect l="32381" t="0" r="0" b="0"/>
           <a:stretch/>
         </p:blipFill>
-        <p:spPr>
+        <p:spPr bwMode="auto">
           <a:xfrm>
             <a:off x="5283000" y="3987360"/>
             <a:ext cx="4126680" cy="1584360"/>
@@ -1946,10 +2490,10 @@
           <p:nvPr/>
         </p:nvPicPr>
         <p:blipFill>
-          <a:blip r:embed="rId6"/>
+          <a:blip r:embed="rId7"/>
           <a:stretch/>
         </p:blipFill>
-        <p:spPr>
+        <p:spPr bwMode="auto">
           <a:xfrm>
             <a:off x="6609960" y="5983560"/>
             <a:ext cx="1230120" cy="348480"/>
@@ -1969,10 +2513,10 @@
           <p:nvPr/>
         </p:nvPicPr>
         <p:blipFill>
-          <a:blip r:embed="rId7"/>
+          <a:blip r:embed="rId8"/>
           <a:stretch/>
         </p:blipFill>
-        <p:spPr>
+        <p:spPr bwMode="auto">
           <a:xfrm>
             <a:off x="8199000" y="5954760"/>
             <a:ext cx="2920680" cy="406080"/>
@@ -1992,10 +2536,10 @@
           <p:nvPr/>
         </p:nvPicPr>
         <p:blipFill>
-          <a:blip r:embed="rId8"/>
+          <a:blip r:embed="rId9"/>
           <a:stretch/>
         </p:blipFill>
-        <p:spPr>
+        <p:spPr bwMode="auto">
           <a:xfrm>
             <a:off x="1690200" y="6034320"/>
             <a:ext cx="648720" cy="298080"/>
@@ -2014,7 +2558,7 @@
           <p:cNvSpPr/>
           <p:nvPr/>
         </p:nvSpPr>
-        <p:spPr>
+        <p:spPr bwMode="auto">
           <a:xfrm>
             <a:off x="765720" y="5943960"/>
             <a:ext cx="985680" cy="250200"/>
@@ -2034,7 +2578,7 @@
           <a:fontRef idx="minor"/>
         </p:style>
         <p:txBody>
-          <a:bodyPr wrap="none" lIns="90000" rIns="90000" tIns="45000" bIns="45000">
+          <a:bodyPr wrap="none" lIns="90000" tIns="45000" rIns="90000" bIns="45000">
             <a:spAutoFit/>
           </a:bodyPr>
           <a:p>
@@ -2042,9 +2586,10 @@
               <a:lnSpc>
                 <a:spcPct val="100000"/>
               </a:lnSpc>
+              <a:defRPr/>
             </a:pPr>
             <a:r>
-              <a:rPr b="0" lang="nl-NL" sz="1050" spc="-1" strike="noStrike">
+              <a:rPr lang="nl-NL" sz="1050" b="0" strike="noStrike" spc="-1">
                 <a:solidFill>
                   <a:srgbClr val="000000"/>
                 </a:solidFill>
@@ -2052,7 +2597,7 @@
               </a:rPr>
               <a:t>maintained by:</a:t>
             </a:r>
-            <a:endParaRPr b="0" lang="en-US" sz="1050" spc="-1" strike="noStrike">
+            <a:endParaRPr lang="en-US" sz="1050" b="0" strike="noStrike" spc="-1">
               <a:latin typeface="Arial"/>
             </a:endParaRPr>
           </a:p>
@@ -2060,19 +2605,22 @@
       </p:sp>
     </p:spTree>
   </p:cSld>
-  <mc:AlternateContent>
-    <mc:Choice Requires="p14">
-      <p:transition spd="slow" p14:dur="2000"/>
+  <p:clrMapOvr>
+    <a:masterClrMapping/>
+  </p:clrMapOvr>
+  <mc:AlternateContent xmlns:mc="http://schemas.openxmlformats.org/markup-compatibility/2006">
+    <mc:Choice xmlns:p159="http://schemas.microsoft.com/office/powerpoint/2015/09/main" xmlns:p14="http://schemas.microsoft.com/office/powerpoint/2010/main" Requires="p159">
+      <p:transition p14:dur="2000" advClick="1"/>
     </mc:Choice>
     <mc:Fallback>
-      <p:transition spd="slow"/>
+      <p:transition advClick="1"/>
     </mc:Fallback>
   </mc:AlternateContent>
 </p:sld>
 </file>
 
 <file path=ppt/theme/theme1.xml><?xml version="1.0" encoding="utf-8"?>
-<a:theme xmlns:a="http://schemas.openxmlformats.org/drawingml/2006/main" name="Office Theme">
+<a:theme xmlns:a="http://schemas.openxmlformats.org/drawingml/2006/main" xmlns:r="http://schemas.openxmlformats.org/officeDocument/2006/relationships" xmlns:p="http://schemas.openxmlformats.org/presentationml/2006/main" name="Office Theme">
   <a:themeElements>
     <a:clrScheme name="Office">
       <a:dk1>
@@ -2082,34 +2630,34 @@
         <a:sysClr val="window" lastClr="FFFFFF"/>
       </a:lt1>
       <a:dk2>
-        <a:srgbClr val="44546a"/>
+        <a:srgbClr val="44546A"/>
       </a:dk2>
       <a:lt2>
-        <a:srgbClr val="e7e6e6"/>
+        <a:srgbClr val="E7E6E6"/>
       </a:lt2>
       <a:accent1>
-        <a:srgbClr val="4472c4"/>
+        <a:srgbClr val="4472C4"/>
       </a:accent1>
       <a:accent2>
-        <a:srgbClr val="ed7d31"/>
+        <a:srgbClr val="ED7D31"/>
       </a:accent2>
       <a:accent3>
-        <a:srgbClr val="a5a5a5"/>
+        <a:srgbClr val="A5A5A5"/>
       </a:accent3>
       <a:accent4>
-        <a:srgbClr val="ffc000"/>
+        <a:srgbClr val="FFC000"/>
       </a:accent4>
       <a:accent5>
-        <a:srgbClr val="5b9bd5"/>
+        <a:srgbClr val="5B9BD5"/>
       </a:accent5>
       <a:accent6>
-        <a:srgbClr val="70ad47"/>
+        <a:srgbClr val="70AD47"/>
       </a:accent6>
       <a:hlink>
-        <a:srgbClr val="0563c1"/>
+        <a:srgbClr val="0563C1"/>
       </a:hlink>
       <a:folHlink>
-        <a:srgbClr val="954f72"/>
+        <a:srgbClr val="954F72"/>
       </a:folHlink>
     </a:clrScheme>
     <a:fontScheme name="Office">
@@ -2129,7 +2677,7 @@
         <a:solidFill>
           <a:schemeClr val="phClr"/>
         </a:solidFill>
-        <a:gradFill rotWithShape="1">
+        <a:gradFill>
           <a:gsLst>
             <a:gs pos="0">
               <a:schemeClr val="phClr">
@@ -2152,7 +2700,7 @@
           </a:gsLst>
           <a:lin ang="16200000" scaled="1"/>
         </a:gradFill>
-        <a:gradFill rotWithShape="1">
+        <a:gradFill>
           <a:gsLst>
             <a:gs pos="0">
               <a:schemeClr val="phClr">
@@ -2229,24 +2777,13 @@
               </a:srgbClr>
             </a:outerShdw>
           </a:effectLst>
-          <a:scene3d>
-            <a:camera prst="orthographicFront">
-              <a:rot lat="0" lon="0" rev="0"/>
-            </a:camera>
-            <a:lightRig rig="threePt" dir="t">
-              <a:rot lat="0" lon="0" rev="1200000"/>
-            </a:lightRig>
-          </a:scene3d>
-          <a:sp3d>
-            <a:bevelT w="63500" h="25400"/>
-          </a:sp3d>
         </a:effectStyle>
       </a:effectStyleLst>
       <a:bgFillStyleLst>
         <a:solidFill>
           <a:schemeClr val="phClr"/>
         </a:solidFill>
-        <a:gradFill rotWithShape="1">
+        <a:gradFill>
           <a:gsLst>
             <a:gs pos="0">
               <a:schemeClr val="phClr">
@@ -2268,11 +2805,9 @@
               </a:schemeClr>
             </a:gs>
           </a:gsLst>
-          <a:path path="circle">
-            <a:fillToRect l="50000" t="-80000" r="50000" b="180000"/>
-          </a:path>
+          <a:path path="circle"/>
         </a:gradFill>
-        <a:gradFill rotWithShape="1">
+        <a:gradFill>
           <a:gsLst>
             <a:gs pos="0">
               <a:schemeClr val="phClr">
@@ -2287,12 +2822,223 @@
               </a:schemeClr>
             </a:gs>
           </a:gsLst>
-          <a:path path="circle">
-            <a:fillToRect l="50000" t="50000" r="50000" b="50000"/>
-          </a:path>
+          <a:path path="circle"/>
         </a:gradFill>
       </a:bgFillStyleLst>
     </a:fmtScheme>
   </a:themeElements>
+  <a:objectDefaults/>
+</a:theme>
+</file>
+
+<file path=ppt/theme/theme2.xml><?xml version="1.0" encoding="utf-8"?>
+<a:theme xmlns:a="http://schemas.openxmlformats.org/drawingml/2006/main" xmlns:r="http://schemas.openxmlformats.org/officeDocument/2006/relationships" xmlns:p="http://schemas.openxmlformats.org/presentationml/2006/main" name="Office Theme">
+  <a:themeElements>
+    <a:clrScheme name="Office">
+      <a:dk1>
+        <a:sysClr val="windowText" lastClr="000000"/>
+      </a:dk1>
+      <a:lt1>
+        <a:sysClr val="window" lastClr="FFFFFF"/>
+      </a:lt1>
+      <a:dk2>
+        <a:srgbClr val="44546A"/>
+      </a:dk2>
+      <a:lt2>
+        <a:srgbClr val="E7E6E6"/>
+      </a:lt2>
+      <a:accent1>
+        <a:srgbClr val="4472C4"/>
+      </a:accent1>
+      <a:accent2>
+        <a:srgbClr val="ED7D31"/>
+      </a:accent2>
+      <a:accent3>
+        <a:srgbClr val="A5A5A5"/>
+      </a:accent3>
+      <a:accent4>
+        <a:srgbClr val="FFC000"/>
+      </a:accent4>
+      <a:accent5>
+        <a:srgbClr val="5B9BD5"/>
+      </a:accent5>
+      <a:accent6>
+        <a:srgbClr val="70AD47"/>
+      </a:accent6>
+      <a:hlink>
+        <a:srgbClr val="0563C1"/>
+      </a:hlink>
+      <a:folHlink>
+        <a:srgbClr val="954F72"/>
+      </a:folHlink>
+    </a:clrScheme>
+    <a:fontScheme name="">
+      <a:majorFont>
+        <a:latin typeface="Arial"/>
+        <a:ea typeface="DejaVu Sans"/>
+        <a:cs typeface="DejaVu Sans"/>
+      </a:majorFont>
+      <a:minorFont>
+        <a:latin typeface="Arial"/>
+        <a:ea typeface="DejaVu Sans"/>
+        <a:cs typeface="DejaVu Sans"/>
+      </a:minorFont>
+    </a:fontScheme>
+    <a:fmtScheme name="Office">
+      <a:fillStyleLst>
+        <a:solidFill>
+          <a:schemeClr val="phClr"/>
+        </a:solidFill>
+        <a:gradFill>
+          <a:gsLst>
+            <a:gs pos="0">
+              <a:schemeClr val="phClr">
+                <a:tint val="50000"/>
+                <a:satMod val="300000"/>
+              </a:schemeClr>
+            </a:gs>
+            <a:gs pos="35000">
+              <a:schemeClr val="phClr">
+                <a:tint val="37000"/>
+                <a:satMod val="300000"/>
+              </a:schemeClr>
+            </a:gs>
+            <a:gs pos="100000">
+              <a:schemeClr val="phClr">
+                <a:tint val="15000"/>
+                <a:satMod val="350000"/>
+              </a:schemeClr>
+            </a:gs>
+          </a:gsLst>
+          <a:lin ang="16200000" scaled="1"/>
+        </a:gradFill>
+        <a:gradFill>
+          <a:gsLst>
+            <a:gs pos="0">
+              <a:schemeClr val="phClr">
+                <a:shade val="51000"/>
+                <a:satMod val="130000"/>
+              </a:schemeClr>
+            </a:gs>
+            <a:gs pos="80000">
+              <a:schemeClr val="phClr">
+                <a:shade val="93000"/>
+                <a:satMod val="130000"/>
+              </a:schemeClr>
+            </a:gs>
+            <a:gs pos="100000">
+              <a:schemeClr val="phClr">
+                <a:shade val="94000"/>
+                <a:satMod val="135000"/>
+              </a:schemeClr>
+            </a:gs>
+          </a:gsLst>
+          <a:lin ang="16200000" scaled="0"/>
+        </a:gradFill>
+      </a:fillStyleLst>
+      <a:lnStyleLst>
+        <a:ln w="9525" cap="flat" cmpd="sng" algn="ctr">
+          <a:solidFill>
+            <a:schemeClr val="phClr">
+              <a:shade val="95000"/>
+              <a:satMod val="105000"/>
+            </a:schemeClr>
+          </a:solidFill>
+          <a:prstDash val="solid"/>
+          <a:miter/>
+        </a:ln>
+        <a:ln w="25400" cap="flat" cmpd="sng" algn="ctr">
+          <a:solidFill>
+            <a:schemeClr val="phClr"/>
+          </a:solidFill>
+          <a:prstDash val="solid"/>
+          <a:miter/>
+        </a:ln>
+        <a:ln w="38100" cap="flat" cmpd="sng" algn="ctr">
+          <a:solidFill>
+            <a:schemeClr val="phClr"/>
+          </a:solidFill>
+          <a:prstDash val="solid"/>
+          <a:miter/>
+        </a:ln>
+      </a:lnStyleLst>
+      <a:effectStyleLst>
+        <a:effectStyle>
+          <a:effectLst>
+            <a:outerShdw blurRad="40000" dist="20000" dir="5400000" rotWithShape="0">
+              <a:srgbClr val="000000">
+                <a:alpha val="38000"/>
+              </a:srgbClr>
+            </a:outerShdw>
+          </a:effectLst>
+        </a:effectStyle>
+        <a:effectStyle>
+          <a:effectLst>
+            <a:outerShdw blurRad="40000" dist="23000" dir="5400000" rotWithShape="0">
+              <a:srgbClr val="000000">
+                <a:alpha val="35000"/>
+              </a:srgbClr>
+            </a:outerShdw>
+          </a:effectLst>
+        </a:effectStyle>
+        <a:effectStyle>
+          <a:effectLst>
+            <a:outerShdw blurRad="40000" dist="23000" dir="5400000" rotWithShape="0">
+              <a:srgbClr val="000000">
+                <a:alpha val="35000"/>
+              </a:srgbClr>
+            </a:outerShdw>
+          </a:effectLst>
+        </a:effectStyle>
+      </a:effectStyleLst>
+      <a:bgFillStyleLst>
+        <a:solidFill>
+          <a:schemeClr val="phClr"/>
+        </a:solidFill>
+        <a:gradFill>
+          <a:gsLst>
+            <a:gs pos="0">
+              <a:schemeClr val="phClr">
+                <a:tint val="40000"/>
+                <a:satMod val="350000"/>
+              </a:schemeClr>
+            </a:gs>
+            <a:gs pos="40000">
+              <a:schemeClr val="phClr">
+                <a:tint val="45000"/>
+                <a:shade val="99000"/>
+                <a:satMod val="350000"/>
+              </a:schemeClr>
+            </a:gs>
+            <a:gs pos="100000">
+              <a:schemeClr val="phClr">
+                <a:shade val="20000"/>
+                <a:satMod val="255000"/>
+              </a:schemeClr>
+            </a:gs>
+          </a:gsLst>
+          <a:path path="circle"/>
+        </a:gradFill>
+        <a:gradFill>
+          <a:gsLst>
+            <a:gs pos="0">
+              <a:schemeClr val="phClr">
+                <a:tint val="80000"/>
+                <a:satMod val="300000"/>
+              </a:schemeClr>
+            </a:gs>
+            <a:gs pos="100000">
+              <a:schemeClr val="phClr">
+                <a:shade val="30000"/>
+                <a:satMod val="200000"/>
+              </a:schemeClr>
+            </a:gs>
+          </a:gsLst>
+          <a:path path="circle"/>
+        </a:gradFill>
+      </a:bgFillStyleLst>
+    </a:fmtScheme>
+  </a:themeElements>
+  <a:objectDefaults/>
 </a:theme>
 </file>
</xml_diff>